<commit_message>
New template and minor fixes to slides
</commit_message>
<xml_diff>
--- a/Training-material/day 1/05a_bootcamp-part1.pptx
+++ b/Training-material/day 1/05a_bootcamp-part1.pptx
@@ -9276,7 +9276,7 @@
         <p:spPr>
           <a:xfrm>
             <a:off x="8763625" y="4785937"/>
-            <a:ext cx="203100" cy="307800"/>
+            <a:ext cx="203100" cy="184800"/>
           </a:xfrm>
           <a:prstGeom prst="rect">
             <a:avLst/>
@@ -9287,30 +9287,25 @@
           </a:ln>
         </p:spPr>
         <p:txBody>
-          <a:bodyPr anchorCtr="0" anchor="t" bIns="45700" lIns="45700" spcFirstLastPara="1" rIns="45700" wrap="square" tIns="45700">
+          <a:bodyPr anchorCtr="0" anchor="ctr" bIns="45700" lIns="45700" spcFirstLastPara="1" rIns="45700" wrap="square" tIns="45700">
             <a:spAutoFit/>
           </a:bodyPr>
           <a:lstStyle/>
           <a:p>
-            <a:pPr indent="0" lvl="0" marL="0" marR="0" rtl="0" algn="l">
-              <a:lnSpc>
-                <a:spcPct val="100000"/>
-              </a:lnSpc>
-              <a:spcBef>
-                <a:spcPts val="0"/>
-              </a:spcBef>
-              <a:spcAft>
-                <a:spcPts val="0"/>
-              </a:spcAft>
-              <a:buClr>
-                <a:srgbClr val="000000"/>
-              </a:buClr>
-              <a:buSzPts val="1400"/>
-              <a:buFont typeface="Arial"/>
+            <a:pPr indent="0" lvl="0" marL="0" marR="0" rtl="0" algn="r">
+              <a:lnSpc>
+                <a:spcPct val="100000"/>
+              </a:lnSpc>
+              <a:spcBef>
+                <a:spcPts val="0"/>
+              </a:spcBef>
+              <a:spcAft>
+                <a:spcPts val="0"/>
+              </a:spcAft>
               <a:buNone/>
             </a:pPr>
             <a:fld id="{00000000-1234-1234-1234-123412341234}" type="slidenum">
-              <a:rPr lang="en-US" sz="1400"/>
+              <a:rPr lang="en-US"/>
               <a:t>‹#›</a:t>
             </a:fld>
             <a:endParaRPr/>
@@ -9391,8 +9386,8 @@
         </p:nvSpPr>
         <p:spPr>
           <a:xfrm>
-            <a:off x="-1" y="252413"/>
-            <a:ext cx="8208965" cy="585788"/>
+            <a:off x="284924" y="252413"/>
+            <a:ext cx="8208900" cy="585900"/>
           </a:xfrm>
           <a:prstGeom prst="rect">
             <a:avLst/>
@@ -9452,7 +9447,7 @@
         <p:spPr>
           <a:xfrm>
             <a:off x="8784125" y="4786012"/>
-            <a:ext cx="203100" cy="307800"/>
+            <a:ext cx="203100" cy="184800"/>
           </a:xfrm>
           <a:prstGeom prst="rect">
             <a:avLst/>
@@ -9463,30 +9458,25 @@
           </a:ln>
         </p:spPr>
         <p:txBody>
-          <a:bodyPr anchorCtr="0" anchor="t" bIns="45700" lIns="45700" spcFirstLastPara="1" rIns="45700" wrap="square" tIns="45700">
+          <a:bodyPr anchorCtr="0" anchor="ctr" bIns="45700" lIns="45700" spcFirstLastPara="1" rIns="45700" wrap="square" tIns="45700">
             <a:spAutoFit/>
           </a:bodyPr>
           <a:lstStyle/>
           <a:p>
-            <a:pPr indent="0" lvl="0" marL="0" marR="0" rtl="0" algn="l">
-              <a:lnSpc>
-                <a:spcPct val="100000"/>
-              </a:lnSpc>
-              <a:spcBef>
-                <a:spcPts val="0"/>
-              </a:spcBef>
-              <a:spcAft>
-                <a:spcPts val="0"/>
-              </a:spcAft>
-              <a:buClr>
-                <a:srgbClr val="000000"/>
-              </a:buClr>
-              <a:buSzPts val="1400"/>
-              <a:buFont typeface="Arial"/>
+            <a:pPr indent="0" lvl="0" marL="0" marR="0" rtl="0" algn="r">
+              <a:lnSpc>
+                <a:spcPct val="100000"/>
+              </a:lnSpc>
+              <a:spcBef>
+                <a:spcPts val="0"/>
+              </a:spcBef>
+              <a:spcAft>
+                <a:spcPts val="0"/>
+              </a:spcAft>
               <a:buNone/>
             </a:pPr>
             <a:fld id="{00000000-1234-1234-1234-123412341234}" type="slidenum">
-              <a:rPr lang="en-US" sz="1400"/>
+              <a:rPr lang="en-US"/>
               <a:t>‹#›</a:t>
             </a:fld>
             <a:endParaRPr/>
@@ -9628,7 +9618,7 @@
         <p:spPr>
           <a:xfrm>
             <a:off x="8712550" y="4776637"/>
-            <a:ext cx="203100" cy="307800"/>
+            <a:ext cx="203100" cy="184800"/>
           </a:xfrm>
           <a:prstGeom prst="rect">
             <a:avLst/>
@@ -9639,30 +9629,25 @@
           </a:ln>
         </p:spPr>
         <p:txBody>
-          <a:bodyPr anchorCtr="0" anchor="t" bIns="45700" lIns="45700" spcFirstLastPara="1" rIns="45700" wrap="square" tIns="45700">
+          <a:bodyPr anchorCtr="0" anchor="ctr" bIns="45700" lIns="45700" spcFirstLastPara="1" rIns="45700" wrap="square" tIns="45700">
             <a:spAutoFit/>
           </a:bodyPr>
           <a:lstStyle/>
           <a:p>
-            <a:pPr indent="0" lvl="0" marL="0" marR="0" rtl="0" algn="l">
-              <a:lnSpc>
-                <a:spcPct val="100000"/>
-              </a:lnSpc>
-              <a:spcBef>
-                <a:spcPts val="0"/>
-              </a:spcBef>
-              <a:spcAft>
-                <a:spcPts val="0"/>
-              </a:spcAft>
-              <a:buClr>
-                <a:srgbClr val="000000"/>
-              </a:buClr>
-              <a:buSzPts val="1400"/>
-              <a:buFont typeface="Arial"/>
+            <a:pPr indent="0" lvl="0" marL="0" marR="0" rtl="0" algn="r">
+              <a:lnSpc>
+                <a:spcPct val="100000"/>
+              </a:lnSpc>
+              <a:spcBef>
+                <a:spcPts val="0"/>
+              </a:spcBef>
+              <a:spcAft>
+                <a:spcPts val="0"/>
+              </a:spcAft>
               <a:buNone/>
             </a:pPr>
             <a:fld id="{00000000-1234-1234-1234-123412341234}" type="slidenum">
-              <a:rPr lang="en-US" sz="1400"/>
+              <a:rPr lang="en-US"/>
               <a:t>‹#›</a:t>
             </a:fld>
             <a:endParaRPr/>
@@ -9936,7 +9921,7 @@
         <p:spPr>
           <a:xfrm>
             <a:off x="8784125" y="4804737"/>
-            <a:ext cx="203100" cy="307800"/>
+            <a:ext cx="203100" cy="184800"/>
           </a:xfrm>
           <a:prstGeom prst="rect">
             <a:avLst/>
@@ -9947,30 +9932,25 @@
           </a:ln>
         </p:spPr>
         <p:txBody>
-          <a:bodyPr anchorCtr="0" anchor="t" bIns="45700" lIns="45700" spcFirstLastPara="1" rIns="45700" wrap="square" tIns="45700">
+          <a:bodyPr anchorCtr="0" anchor="ctr" bIns="45700" lIns="45700" spcFirstLastPara="1" rIns="45700" wrap="square" tIns="45700">
             <a:spAutoFit/>
           </a:bodyPr>
           <a:lstStyle/>
           <a:p>
-            <a:pPr indent="0" lvl="0" marL="0" marR="0" rtl="0" algn="l">
-              <a:lnSpc>
-                <a:spcPct val="100000"/>
-              </a:lnSpc>
-              <a:spcBef>
-                <a:spcPts val="0"/>
-              </a:spcBef>
-              <a:spcAft>
-                <a:spcPts val="0"/>
-              </a:spcAft>
-              <a:buClr>
-                <a:srgbClr val="000000"/>
-              </a:buClr>
-              <a:buSzPts val="1400"/>
-              <a:buFont typeface="Arial"/>
+            <a:pPr indent="0" lvl="0" marL="0" marR="0" rtl="0" algn="r">
+              <a:lnSpc>
+                <a:spcPct val="100000"/>
+              </a:lnSpc>
+              <a:spcBef>
+                <a:spcPts val="0"/>
+              </a:spcBef>
+              <a:spcAft>
+                <a:spcPts val="0"/>
+              </a:spcAft>
               <a:buNone/>
             </a:pPr>
             <a:fld id="{00000000-1234-1234-1234-123412341234}" type="slidenum">
-              <a:rPr lang="en-US" sz="1400"/>
+              <a:rPr lang="en-US"/>
               <a:t>‹#›</a:t>
             </a:fld>
             <a:endParaRPr/>
@@ -10499,7 +10479,7 @@
         <p:spPr>
           <a:xfrm>
             <a:off x="8838575" y="4773912"/>
-            <a:ext cx="203100" cy="307800"/>
+            <a:ext cx="203100" cy="184800"/>
           </a:xfrm>
           <a:prstGeom prst="rect">
             <a:avLst/>
@@ -10510,30 +10490,25 @@
           </a:ln>
         </p:spPr>
         <p:txBody>
-          <a:bodyPr anchorCtr="0" anchor="t" bIns="45700" lIns="45700" spcFirstLastPara="1" rIns="45700" wrap="square" tIns="45700">
+          <a:bodyPr anchorCtr="0" anchor="ctr" bIns="45700" lIns="45700" spcFirstLastPara="1" rIns="45700" wrap="square" tIns="45700">
             <a:spAutoFit/>
           </a:bodyPr>
           <a:lstStyle/>
           <a:p>
-            <a:pPr indent="0" lvl="0" marL="0" marR="0" rtl="0" algn="l">
-              <a:lnSpc>
-                <a:spcPct val="100000"/>
-              </a:lnSpc>
-              <a:spcBef>
-                <a:spcPts val="0"/>
-              </a:spcBef>
-              <a:spcAft>
-                <a:spcPts val="0"/>
-              </a:spcAft>
-              <a:buClr>
-                <a:srgbClr val="000000"/>
-              </a:buClr>
-              <a:buSzPts val="1400"/>
-              <a:buFont typeface="Arial"/>
+            <a:pPr indent="0" lvl="0" marL="0" marR="0" rtl="0" algn="r">
+              <a:lnSpc>
+                <a:spcPct val="100000"/>
+              </a:lnSpc>
+              <a:spcBef>
+                <a:spcPts val="0"/>
+              </a:spcBef>
+              <a:spcAft>
+                <a:spcPts val="0"/>
+              </a:spcAft>
               <a:buNone/>
             </a:pPr>
             <a:fld id="{00000000-1234-1234-1234-123412341234}" type="slidenum">
-              <a:rPr lang="en-US" sz="1400"/>
+              <a:rPr lang="en-US"/>
               <a:t>‹#›</a:t>
             </a:fld>
             <a:endParaRPr/>
@@ -10865,21 +10840,22 @@
       </p:pic>
       <p:pic>
         <p:nvPicPr>
-          <p:cNvPr descr="Picture 11" id="131" name="Google Shape;131;p6"/>
+          <p:cNvPr id="131" name="Google Shape;131;p6"/>
           <p:cNvPicPr preferRelativeResize="0"/>
           <p:nvPr/>
         </p:nvPicPr>
-        <p:blipFill rotWithShape="1">
+        <p:blipFill>
           <a:blip r:embed="rId4">
             <a:alphaModFix/>
           </a:blip>
-          <a:srcRect b="0" l="0" r="0" t="0"/>
-          <a:stretch/>
+          <a:stretch>
+            <a:fillRect/>
+          </a:stretch>
         </p:blipFill>
         <p:spPr>
-          <a:xfrm rot="598691">
-            <a:off x="4655644" y="2065975"/>
-            <a:ext cx="3471184" cy="2404556"/>
+          <a:xfrm rot="598688">
+            <a:off x="4744175" y="1757177"/>
+            <a:ext cx="3066124" cy="2685499"/>
           </a:xfrm>
           <a:prstGeom prst="rect">
             <a:avLst/>
@@ -11339,6 +11315,285 @@
 </file>
 
 <file path=ppt/theme/theme1.xml><?xml version="1.0" encoding="utf-8"?>
+<a:theme xmlns:a="http://schemas.openxmlformats.org/drawingml/2006/main" xmlns:r="http://schemas.openxmlformats.org/officeDocument/2006/relationships" name="Office Theme">
+  <a:themeElements>
+    <a:clrScheme name="Office Theme">
+      <a:dk1>
+        <a:srgbClr val="000000"/>
+      </a:dk1>
+      <a:lt1>
+        <a:srgbClr val="FFFFFF"/>
+      </a:lt1>
+      <a:dk2>
+        <a:srgbClr val="A7A7A7"/>
+      </a:dk2>
+      <a:lt2>
+        <a:srgbClr val="535353"/>
+      </a:lt2>
+      <a:accent1>
+        <a:srgbClr val="4472C4"/>
+      </a:accent1>
+      <a:accent2>
+        <a:srgbClr val="ED7D31"/>
+      </a:accent2>
+      <a:accent3>
+        <a:srgbClr val="A5A5A5"/>
+      </a:accent3>
+      <a:accent4>
+        <a:srgbClr val="FFC000"/>
+      </a:accent4>
+      <a:accent5>
+        <a:srgbClr val="5B9BD5"/>
+      </a:accent5>
+      <a:accent6>
+        <a:srgbClr val="70AD47"/>
+      </a:accent6>
+      <a:hlink>
+        <a:srgbClr val="0000FF"/>
+      </a:hlink>
+      <a:folHlink>
+        <a:srgbClr val="FF00FF"/>
+      </a:folHlink>
+    </a:clrScheme>
+    <a:fontScheme name="Office">
+      <a:majorFont>
+        <a:latin typeface="Arial"/>
+        <a:ea typeface=""/>
+        <a:cs typeface=""/>
+        <a:font script="Jpan" typeface="ＭＳ Ｐゴシック"/>
+        <a:font script="Hang" typeface="맑은 고딕"/>
+        <a:font script="Hans" typeface="宋体"/>
+        <a:font script="Hant" typeface="新細明體"/>
+        <a:font script="Arab" typeface="Times New Roman"/>
+        <a:font script="Hebr" typeface="Times New Roman"/>
+        <a:font script="Thai" typeface="Angsana New"/>
+        <a:font script="Ethi" typeface="Nyala"/>
+        <a:font script="Beng" typeface="Vrinda"/>
+        <a:font script="Gujr" typeface="Shruti"/>
+        <a:font script="Khmr" typeface="MoolBoran"/>
+        <a:font script="Knda" typeface="Tunga"/>
+        <a:font script="Guru" typeface="Raavi"/>
+        <a:font script="Cans" typeface="Euphemia"/>
+        <a:font script="Cher" typeface="Plantagenet Cherokee"/>
+        <a:font script="Yiii" typeface="Microsoft Yi Baiti"/>
+        <a:font script="Tibt" typeface="Microsoft Himalaya"/>
+        <a:font script="Thaa" typeface="MV Boli"/>
+        <a:font script="Deva" typeface="Mangal"/>
+        <a:font script="Telu" typeface="Gautami"/>
+        <a:font script="Taml" typeface="Latha"/>
+        <a:font script="Syrc" typeface="Estrangelo Edessa"/>
+        <a:font script="Orya" typeface="Kalinga"/>
+        <a:font script="Mlym" typeface="Kartika"/>
+        <a:font script="Laoo" typeface="DokChampa"/>
+        <a:font script="Sinh" typeface="Iskoola Pota"/>
+        <a:font script="Mong" typeface="Mongolian Baiti"/>
+        <a:font script="Viet" typeface="Times New Roman"/>
+        <a:font script="Uigh" typeface="Microsoft Uighur"/>
+        <a:font script="Geor" typeface="Sylfaen"/>
+      </a:majorFont>
+      <a:minorFont>
+        <a:latin typeface="Arial"/>
+        <a:ea typeface=""/>
+        <a:cs typeface=""/>
+        <a:font script="Jpan" typeface="ＭＳ Ｐゴシック"/>
+        <a:font script="Hang" typeface="맑은 고딕"/>
+        <a:font script="Hans" typeface="宋体"/>
+        <a:font script="Hant" typeface="新細明體"/>
+        <a:font script="Arab" typeface="Arial"/>
+        <a:font script="Hebr" typeface="Arial"/>
+        <a:font script="Thai" typeface="Cordia New"/>
+        <a:font script="Ethi" typeface="Nyala"/>
+        <a:font script="Beng" typeface="Vrinda"/>
+        <a:font script="Gujr" typeface="Shruti"/>
+        <a:font script="Khmr" typeface="DaunPenh"/>
+        <a:font script="Knda" typeface="Tunga"/>
+        <a:font script="Guru" typeface="Raavi"/>
+        <a:font script="Cans" typeface="Euphemia"/>
+        <a:font script="Cher" typeface="Plantagenet Cherokee"/>
+        <a:font script="Yiii" typeface="Microsoft Yi Baiti"/>
+        <a:font script="Tibt" typeface="Microsoft Himalaya"/>
+        <a:font script="Thaa" typeface="MV Boli"/>
+        <a:font script="Deva" typeface="Mangal"/>
+        <a:font script="Telu" typeface="Gautami"/>
+        <a:font script="Taml" typeface="Latha"/>
+        <a:font script="Syrc" typeface="Estrangelo Edessa"/>
+        <a:font script="Orya" typeface="Kalinga"/>
+        <a:font script="Mlym" typeface="Kartika"/>
+        <a:font script="Laoo" typeface="DokChampa"/>
+        <a:font script="Sinh" typeface="Iskoola Pota"/>
+        <a:font script="Mong" typeface="Mongolian Baiti"/>
+        <a:font script="Viet" typeface="Arial"/>
+        <a:font script="Uigh" typeface="Microsoft Uighur"/>
+        <a:font script="Geor" typeface="Sylfaen"/>
+      </a:minorFont>
+    </a:fontScheme>
+    <a:fmtScheme name="Office">
+      <a:fillStyleLst>
+        <a:solidFill>
+          <a:schemeClr val="phClr"/>
+        </a:solidFill>
+        <a:gradFill rotWithShape="1">
+          <a:gsLst>
+            <a:gs pos="0">
+              <a:schemeClr val="phClr">
+                <a:tint val="50000"/>
+                <a:satMod val="300000"/>
+              </a:schemeClr>
+            </a:gs>
+            <a:gs pos="35000">
+              <a:schemeClr val="phClr">
+                <a:tint val="37000"/>
+                <a:satMod val="300000"/>
+              </a:schemeClr>
+            </a:gs>
+            <a:gs pos="100000">
+              <a:schemeClr val="phClr">
+                <a:tint val="15000"/>
+                <a:satMod val="350000"/>
+              </a:schemeClr>
+            </a:gs>
+          </a:gsLst>
+          <a:lin ang="16200000" scaled="1"/>
+        </a:gradFill>
+        <a:gradFill rotWithShape="1">
+          <a:gsLst>
+            <a:gs pos="0">
+              <a:schemeClr val="phClr">
+                <a:tint val="100000"/>
+                <a:shade val="100000"/>
+                <a:satMod val="130000"/>
+              </a:schemeClr>
+            </a:gs>
+            <a:gs pos="100000">
+              <a:schemeClr val="phClr">
+                <a:tint val="50000"/>
+                <a:shade val="100000"/>
+                <a:satMod val="350000"/>
+              </a:schemeClr>
+            </a:gs>
+          </a:gsLst>
+          <a:lin ang="16200000" scaled="0"/>
+        </a:gradFill>
+      </a:fillStyleLst>
+      <a:lnStyleLst>
+        <a:ln w="9525" cap="flat" cmpd="sng" algn="ctr">
+          <a:solidFill>
+            <a:schemeClr val="phClr">
+              <a:shade val="95000"/>
+              <a:satMod val="105000"/>
+            </a:schemeClr>
+          </a:solidFill>
+          <a:prstDash val="solid"/>
+        </a:ln>
+        <a:ln w="25400" cap="flat" cmpd="sng" algn="ctr">
+          <a:solidFill>
+            <a:schemeClr val="phClr"/>
+          </a:solidFill>
+          <a:prstDash val="solid"/>
+        </a:ln>
+        <a:ln w="38100" cap="flat" cmpd="sng" algn="ctr">
+          <a:solidFill>
+            <a:schemeClr val="phClr"/>
+          </a:solidFill>
+          <a:prstDash val="solid"/>
+        </a:ln>
+      </a:lnStyleLst>
+      <a:effectStyleLst>
+        <a:effectStyle>
+          <a:effectLst>
+            <a:outerShdw blurRad="40000" dist="20000" dir="5400000" rotWithShape="0">
+              <a:srgbClr val="000000">
+                <a:alpha val="38000"/>
+              </a:srgbClr>
+            </a:outerShdw>
+          </a:effectLst>
+        </a:effectStyle>
+        <a:effectStyle>
+          <a:effectLst>
+            <a:outerShdw blurRad="40000" dist="23000" dir="5400000" rotWithShape="0">
+              <a:srgbClr val="000000">
+                <a:alpha val="35000"/>
+              </a:srgbClr>
+            </a:outerShdw>
+          </a:effectLst>
+        </a:effectStyle>
+        <a:effectStyle>
+          <a:effectLst>
+            <a:outerShdw blurRad="40000" dist="23000" dir="5400000" rotWithShape="0">
+              <a:srgbClr val="000000">
+                <a:alpha val="35000"/>
+              </a:srgbClr>
+            </a:outerShdw>
+          </a:effectLst>
+          <a:scene3d>
+            <a:camera prst="orthographicFront">
+              <a:rot lat="0" lon="0" rev="0"/>
+            </a:camera>
+            <a:lightRig rig="threePt" dir="t">
+              <a:rot lat="0" lon="0" rev="1200000"/>
+            </a:lightRig>
+          </a:scene3d>
+          <a:sp3d>
+            <a:bevelT w="63500" h="25400"/>
+          </a:sp3d>
+        </a:effectStyle>
+      </a:effectStyleLst>
+      <a:bgFillStyleLst>
+        <a:solidFill>
+          <a:schemeClr val="phClr"/>
+        </a:solidFill>
+        <a:gradFill rotWithShape="1">
+          <a:gsLst>
+            <a:gs pos="0">
+              <a:schemeClr val="phClr">
+                <a:tint val="40000"/>
+                <a:satMod val="350000"/>
+              </a:schemeClr>
+            </a:gs>
+            <a:gs pos="40000">
+              <a:schemeClr val="phClr">
+                <a:tint val="45000"/>
+                <a:shade val="99000"/>
+                <a:satMod val="350000"/>
+              </a:schemeClr>
+            </a:gs>
+            <a:gs pos="100000">
+              <a:schemeClr val="phClr">
+                <a:shade val="20000"/>
+                <a:satMod val="255000"/>
+              </a:schemeClr>
+            </a:gs>
+          </a:gsLst>
+          <a:path path="circle">
+            <a:fillToRect l="50000" t="-80000" r="50000" b="180000"/>
+          </a:path>
+        </a:gradFill>
+        <a:gradFill rotWithShape="1">
+          <a:gsLst>
+            <a:gs pos="0">
+              <a:schemeClr val="phClr">
+                <a:tint val="80000"/>
+                <a:satMod val="300000"/>
+              </a:schemeClr>
+            </a:gs>
+            <a:gs pos="100000">
+              <a:schemeClr val="phClr">
+                <a:shade val="30000"/>
+                <a:satMod val="200000"/>
+              </a:schemeClr>
+            </a:gs>
+          </a:gsLst>
+          <a:path path="circle">
+            <a:fillToRect l="50000" t="50000" r="50000" b="50000"/>
+          </a:path>
+        </a:gradFill>
+      </a:bgFillStyleLst>
+    </a:fmtScheme>
+  </a:themeElements>
+</a:theme>
+</file>
+
+<file path=ppt/theme/theme2.xml><?xml version="1.0" encoding="utf-8"?>
 <a:theme xmlns:a="http://schemas.openxmlformats.org/drawingml/2006/main" xmlns:r="http://schemas.openxmlformats.org/officeDocument/2006/relationships" name="1_Office Theme">
   <a:themeElements>
     <a:clrScheme name="1_Office Theme">
@@ -11615,283 +11870,4 @@
     </a:fmtScheme>
   </a:themeElements>
 </a:theme>
-</file>
-
-<file path=ppt/theme/theme2.xml><?xml version="1.0" encoding="utf-8"?>
-<a:theme xmlns:a="http://schemas.openxmlformats.org/drawingml/2006/main" xmlns:r="http://schemas.openxmlformats.org/officeDocument/2006/relationships" name="Office Theme">
-  <a:themeElements>
-    <a:clrScheme name="Office Theme">
-      <a:dk1>
-        <a:srgbClr val="000000"/>
-      </a:dk1>
-      <a:lt1>
-        <a:srgbClr val="FFFFFF"/>
-      </a:lt1>
-      <a:dk2>
-        <a:srgbClr val="A7A7A7"/>
-      </a:dk2>
-      <a:lt2>
-        <a:srgbClr val="535353"/>
-      </a:lt2>
-      <a:accent1>
-        <a:srgbClr val="4472C4"/>
-      </a:accent1>
-      <a:accent2>
-        <a:srgbClr val="ED7D31"/>
-      </a:accent2>
-      <a:accent3>
-        <a:srgbClr val="A5A5A5"/>
-      </a:accent3>
-      <a:accent4>
-        <a:srgbClr val="FFC000"/>
-      </a:accent4>
-      <a:accent5>
-        <a:srgbClr val="5B9BD5"/>
-      </a:accent5>
-      <a:accent6>
-        <a:srgbClr val="70AD47"/>
-      </a:accent6>
-      <a:hlink>
-        <a:srgbClr val="0000FF"/>
-      </a:hlink>
-      <a:folHlink>
-        <a:srgbClr val="FF00FF"/>
-      </a:folHlink>
-    </a:clrScheme>
-    <a:fontScheme name="Office">
-      <a:majorFont>
-        <a:latin typeface="Arial"/>
-        <a:ea typeface=""/>
-        <a:cs typeface=""/>
-        <a:font script="Jpan" typeface="ＭＳ Ｐゴシック"/>
-        <a:font script="Hang" typeface="맑은 고딕"/>
-        <a:font script="Hans" typeface="宋体"/>
-        <a:font script="Hant" typeface="新細明體"/>
-        <a:font script="Arab" typeface="Times New Roman"/>
-        <a:font script="Hebr" typeface="Times New Roman"/>
-        <a:font script="Thai" typeface="Angsana New"/>
-        <a:font script="Ethi" typeface="Nyala"/>
-        <a:font script="Beng" typeface="Vrinda"/>
-        <a:font script="Gujr" typeface="Shruti"/>
-        <a:font script="Khmr" typeface="MoolBoran"/>
-        <a:font script="Knda" typeface="Tunga"/>
-        <a:font script="Guru" typeface="Raavi"/>
-        <a:font script="Cans" typeface="Euphemia"/>
-        <a:font script="Cher" typeface="Plantagenet Cherokee"/>
-        <a:font script="Yiii" typeface="Microsoft Yi Baiti"/>
-        <a:font script="Tibt" typeface="Microsoft Himalaya"/>
-        <a:font script="Thaa" typeface="MV Boli"/>
-        <a:font script="Deva" typeface="Mangal"/>
-        <a:font script="Telu" typeface="Gautami"/>
-        <a:font script="Taml" typeface="Latha"/>
-        <a:font script="Syrc" typeface="Estrangelo Edessa"/>
-        <a:font script="Orya" typeface="Kalinga"/>
-        <a:font script="Mlym" typeface="Kartika"/>
-        <a:font script="Laoo" typeface="DokChampa"/>
-        <a:font script="Sinh" typeface="Iskoola Pota"/>
-        <a:font script="Mong" typeface="Mongolian Baiti"/>
-        <a:font script="Viet" typeface="Times New Roman"/>
-        <a:font script="Uigh" typeface="Microsoft Uighur"/>
-        <a:font script="Geor" typeface="Sylfaen"/>
-      </a:majorFont>
-      <a:minorFont>
-        <a:latin typeface="Arial"/>
-        <a:ea typeface=""/>
-        <a:cs typeface=""/>
-        <a:font script="Jpan" typeface="ＭＳ Ｐゴシック"/>
-        <a:font script="Hang" typeface="맑은 고딕"/>
-        <a:font script="Hans" typeface="宋体"/>
-        <a:font script="Hant" typeface="新細明體"/>
-        <a:font script="Arab" typeface="Arial"/>
-        <a:font script="Hebr" typeface="Arial"/>
-        <a:font script="Thai" typeface="Cordia New"/>
-        <a:font script="Ethi" typeface="Nyala"/>
-        <a:font script="Beng" typeface="Vrinda"/>
-        <a:font script="Gujr" typeface="Shruti"/>
-        <a:font script="Khmr" typeface="DaunPenh"/>
-        <a:font script="Knda" typeface="Tunga"/>
-        <a:font script="Guru" typeface="Raavi"/>
-        <a:font script="Cans" typeface="Euphemia"/>
-        <a:font script="Cher" typeface="Plantagenet Cherokee"/>
-        <a:font script="Yiii" typeface="Microsoft Yi Baiti"/>
-        <a:font script="Tibt" typeface="Microsoft Himalaya"/>
-        <a:font script="Thaa" typeface="MV Boli"/>
-        <a:font script="Deva" typeface="Mangal"/>
-        <a:font script="Telu" typeface="Gautami"/>
-        <a:font script="Taml" typeface="Latha"/>
-        <a:font script="Syrc" typeface="Estrangelo Edessa"/>
-        <a:font script="Orya" typeface="Kalinga"/>
-        <a:font script="Mlym" typeface="Kartika"/>
-        <a:font script="Laoo" typeface="DokChampa"/>
-        <a:font script="Sinh" typeface="Iskoola Pota"/>
-        <a:font script="Mong" typeface="Mongolian Baiti"/>
-        <a:font script="Viet" typeface="Arial"/>
-        <a:font script="Uigh" typeface="Microsoft Uighur"/>
-        <a:font script="Geor" typeface="Sylfaen"/>
-      </a:minorFont>
-    </a:fontScheme>
-    <a:fmtScheme name="Office">
-      <a:fillStyleLst>
-        <a:solidFill>
-          <a:schemeClr val="phClr"/>
-        </a:solidFill>
-        <a:gradFill rotWithShape="1">
-          <a:gsLst>
-            <a:gs pos="0">
-              <a:schemeClr val="phClr">
-                <a:tint val="50000"/>
-                <a:satMod val="300000"/>
-              </a:schemeClr>
-            </a:gs>
-            <a:gs pos="35000">
-              <a:schemeClr val="phClr">
-                <a:tint val="37000"/>
-                <a:satMod val="300000"/>
-              </a:schemeClr>
-            </a:gs>
-            <a:gs pos="100000">
-              <a:schemeClr val="phClr">
-                <a:tint val="15000"/>
-                <a:satMod val="350000"/>
-              </a:schemeClr>
-            </a:gs>
-          </a:gsLst>
-          <a:lin ang="16200000" scaled="1"/>
-        </a:gradFill>
-        <a:gradFill rotWithShape="1">
-          <a:gsLst>
-            <a:gs pos="0">
-              <a:schemeClr val="phClr">
-                <a:tint val="100000"/>
-                <a:shade val="100000"/>
-                <a:satMod val="130000"/>
-              </a:schemeClr>
-            </a:gs>
-            <a:gs pos="100000">
-              <a:schemeClr val="phClr">
-                <a:tint val="50000"/>
-                <a:shade val="100000"/>
-                <a:satMod val="350000"/>
-              </a:schemeClr>
-            </a:gs>
-          </a:gsLst>
-          <a:lin ang="16200000" scaled="0"/>
-        </a:gradFill>
-      </a:fillStyleLst>
-      <a:lnStyleLst>
-        <a:ln w="9525" cap="flat" cmpd="sng" algn="ctr">
-          <a:solidFill>
-            <a:schemeClr val="phClr">
-              <a:shade val="95000"/>
-              <a:satMod val="105000"/>
-            </a:schemeClr>
-          </a:solidFill>
-          <a:prstDash val="solid"/>
-        </a:ln>
-        <a:ln w="25400" cap="flat" cmpd="sng" algn="ctr">
-          <a:solidFill>
-            <a:schemeClr val="phClr"/>
-          </a:solidFill>
-          <a:prstDash val="solid"/>
-        </a:ln>
-        <a:ln w="38100" cap="flat" cmpd="sng" algn="ctr">
-          <a:solidFill>
-            <a:schemeClr val="phClr"/>
-          </a:solidFill>
-          <a:prstDash val="solid"/>
-        </a:ln>
-      </a:lnStyleLst>
-      <a:effectStyleLst>
-        <a:effectStyle>
-          <a:effectLst>
-            <a:outerShdw blurRad="40000" dist="20000" dir="5400000" rotWithShape="0">
-              <a:srgbClr val="000000">
-                <a:alpha val="38000"/>
-              </a:srgbClr>
-            </a:outerShdw>
-          </a:effectLst>
-        </a:effectStyle>
-        <a:effectStyle>
-          <a:effectLst>
-            <a:outerShdw blurRad="40000" dist="23000" dir="5400000" rotWithShape="0">
-              <a:srgbClr val="000000">
-                <a:alpha val="35000"/>
-              </a:srgbClr>
-            </a:outerShdw>
-          </a:effectLst>
-        </a:effectStyle>
-        <a:effectStyle>
-          <a:effectLst>
-            <a:outerShdw blurRad="40000" dist="23000" dir="5400000" rotWithShape="0">
-              <a:srgbClr val="000000">
-                <a:alpha val="35000"/>
-              </a:srgbClr>
-            </a:outerShdw>
-          </a:effectLst>
-          <a:scene3d>
-            <a:camera prst="orthographicFront">
-              <a:rot lat="0" lon="0" rev="0"/>
-            </a:camera>
-            <a:lightRig rig="threePt" dir="t">
-              <a:rot lat="0" lon="0" rev="1200000"/>
-            </a:lightRig>
-          </a:scene3d>
-          <a:sp3d>
-            <a:bevelT w="63500" h="25400"/>
-          </a:sp3d>
-        </a:effectStyle>
-      </a:effectStyleLst>
-      <a:bgFillStyleLst>
-        <a:solidFill>
-          <a:schemeClr val="phClr"/>
-        </a:solidFill>
-        <a:gradFill rotWithShape="1">
-          <a:gsLst>
-            <a:gs pos="0">
-              <a:schemeClr val="phClr">
-                <a:tint val="40000"/>
-                <a:satMod val="350000"/>
-              </a:schemeClr>
-            </a:gs>
-            <a:gs pos="40000">
-              <a:schemeClr val="phClr">
-                <a:tint val="45000"/>
-                <a:shade val="99000"/>
-                <a:satMod val="350000"/>
-              </a:schemeClr>
-            </a:gs>
-            <a:gs pos="100000">
-              <a:schemeClr val="phClr">
-                <a:shade val="20000"/>
-                <a:satMod val="255000"/>
-              </a:schemeClr>
-            </a:gs>
-          </a:gsLst>
-          <a:path path="circle">
-            <a:fillToRect l="50000" t="-80000" r="50000" b="180000"/>
-          </a:path>
-        </a:gradFill>
-        <a:gradFill rotWithShape="1">
-          <a:gsLst>
-            <a:gs pos="0">
-              <a:schemeClr val="phClr">
-                <a:tint val="80000"/>
-                <a:satMod val="300000"/>
-              </a:schemeClr>
-            </a:gs>
-            <a:gs pos="100000">
-              <a:schemeClr val="phClr">
-                <a:shade val="30000"/>
-                <a:satMod val="200000"/>
-              </a:schemeClr>
-            </a:gs>
-          </a:gsLst>
-          <a:path path="circle">
-            <a:fillToRect l="50000" t="50000" r="50000" b="50000"/>
-          </a:path>
-        </a:gradFill>
-      </a:bgFillStyleLst>
-    </a:fmtScheme>
-  </a:themeElements>
-</a:theme>
 </file>
</xml_diff>

<commit_message>
Minor update (finale version for flux101 - NA 2021)
</commit_message>
<xml_diff>
--- a/Training-material/day 1/05a_bootcamp-part1.pptx
+++ b/Training-material/day 1/05a_bootcamp-part1.pptx
@@ -272,7 +272,7 @@
   </p:defaultTextStyle>
   <p:extLst>
     <p:ext uri="http://customooxmlschemas.google.com/">
-      <go:slidesCustomData xmlns:go="http://customooxmlschemas.google.com/" r:id="rId24" roundtripDataSignature="AMtx7mjTyVNu1ZNXjtDpPwQUdqhA7HHIdw=="/>
+      <go:slidesCustomData xmlns:go="http://customooxmlschemas.google.com/" r:id="rId24" roundtripDataSignature="AMtx7mjQX5LIf/y3s88gceWL+kR8t5E93A=="/>
     </p:ext>
   </p:extLst>
 </p:presentation>
@@ -838,7 +838,7 @@
   <p:cSld>
     <p:spTree>
       <p:nvGrpSpPr>
-        <p:cNvPr id="75" name="Shape 75"/>
+        <p:cNvPr id="74" name="Shape 74"/>
         <p:cNvGrpSpPr/>
         <p:nvPr/>
       </p:nvGrpSpPr>
@@ -852,7 +852,7 @@
       </p:grpSpPr>
       <p:sp>
         <p:nvSpPr>
-          <p:cNvPr id="76" name="Google Shape;76;p1:notes"/>
+          <p:cNvPr id="75" name="Google Shape;75;p1:notes"/>
           <p:cNvSpPr txBox="1"/>
           <p:nvPr>
             <p:ph idx="1" type="body"/>
@@ -899,7 +899,7 @@
       </p:sp>
       <p:sp>
         <p:nvSpPr>
-          <p:cNvPr id="77" name="Google Shape;77;p1:notes"/>
+          <p:cNvPr id="76" name="Google Shape;76;p1:notes"/>
           <p:cNvSpPr/>
           <p:nvPr>
             <p:ph idx="2" type="sldImg"/>
@@ -949,7 +949,7 @@
   <p:cSld>
     <p:spTree>
       <p:nvGrpSpPr>
-        <p:cNvPr id="81" name="Shape 81"/>
+        <p:cNvPr id="80" name="Shape 80"/>
         <p:cNvGrpSpPr/>
         <p:nvPr/>
       </p:nvGrpSpPr>
@@ -963,7 +963,7 @@
       </p:grpSpPr>
       <p:sp>
         <p:nvSpPr>
-          <p:cNvPr id="82" name="Google Shape;82;p2:notes"/>
+          <p:cNvPr id="81" name="Google Shape;81;p2:notes"/>
           <p:cNvSpPr txBox="1"/>
           <p:nvPr>
             <p:ph idx="1" type="body"/>
@@ -1010,7 +1010,7 @@
       </p:sp>
       <p:sp>
         <p:nvSpPr>
-          <p:cNvPr id="83" name="Google Shape;83;p2:notes"/>
+          <p:cNvPr id="82" name="Google Shape;82;p2:notes"/>
           <p:cNvSpPr/>
           <p:nvPr>
             <p:ph idx="2" type="sldImg"/>
@@ -1060,7 +1060,7 @@
   <p:cSld>
     <p:spTree>
       <p:nvGrpSpPr>
-        <p:cNvPr id="88" name="Shape 88"/>
+        <p:cNvPr id="87" name="Shape 87"/>
         <p:cNvGrpSpPr/>
         <p:nvPr/>
       </p:nvGrpSpPr>
@@ -1074,7 +1074,7 @@
       </p:grpSpPr>
       <p:sp>
         <p:nvSpPr>
-          <p:cNvPr id="89" name="Google Shape;89;p3:notes"/>
+          <p:cNvPr id="88" name="Google Shape;88;p3:notes"/>
           <p:cNvSpPr txBox="1"/>
           <p:nvPr>
             <p:ph idx="1" type="body"/>
@@ -1121,7 +1121,7 @@
       </p:sp>
       <p:sp>
         <p:nvSpPr>
-          <p:cNvPr id="90" name="Google Shape;90;p3:notes"/>
+          <p:cNvPr id="89" name="Google Shape;89;p3:notes"/>
           <p:cNvSpPr/>
           <p:nvPr>
             <p:ph idx="2" type="sldImg"/>
@@ -1171,7 +1171,7 @@
   <p:cSld>
     <p:spTree>
       <p:nvGrpSpPr>
-        <p:cNvPr id="95" name="Shape 95"/>
+        <p:cNvPr id="94" name="Shape 94"/>
         <p:cNvGrpSpPr/>
         <p:nvPr/>
       </p:nvGrpSpPr>
@@ -1185,7 +1185,7 @@
       </p:grpSpPr>
       <p:sp>
         <p:nvSpPr>
-          <p:cNvPr id="96" name="Google Shape;96;p4:notes"/>
+          <p:cNvPr id="95" name="Google Shape;95;p4:notes"/>
           <p:cNvSpPr txBox="1"/>
           <p:nvPr>
             <p:ph idx="1" type="body"/>
@@ -1232,7 +1232,7 @@
       </p:sp>
       <p:sp>
         <p:nvSpPr>
-          <p:cNvPr id="97" name="Google Shape;97;p4:notes"/>
+          <p:cNvPr id="96" name="Google Shape;96;p4:notes"/>
           <p:cNvSpPr/>
           <p:nvPr>
             <p:ph idx="2" type="sldImg"/>
@@ -1282,7 +1282,7 @@
   <p:cSld>
     <p:spTree>
       <p:nvGrpSpPr>
-        <p:cNvPr id="105" name="Shape 105"/>
+        <p:cNvPr id="104" name="Shape 104"/>
         <p:cNvGrpSpPr/>
         <p:nvPr/>
       </p:nvGrpSpPr>
@@ -1296,7 +1296,7 @@
       </p:grpSpPr>
       <p:sp>
         <p:nvSpPr>
-          <p:cNvPr id="106" name="Google Shape;106;p5:notes"/>
+          <p:cNvPr id="105" name="Google Shape;105;p5:notes"/>
           <p:cNvSpPr txBox="1"/>
           <p:nvPr>
             <p:ph idx="1" type="body"/>
@@ -1343,7 +1343,7 @@
       </p:sp>
       <p:sp>
         <p:nvSpPr>
-          <p:cNvPr id="107" name="Google Shape;107;p5:notes"/>
+          <p:cNvPr id="106" name="Google Shape;106;p5:notes"/>
           <p:cNvSpPr/>
           <p:nvPr>
             <p:ph idx="2" type="sldImg"/>
@@ -1393,7 +1393,7 @@
   <p:cSld>
     <p:spTree>
       <p:nvGrpSpPr>
-        <p:cNvPr id="119" name="Shape 119"/>
+        <p:cNvPr id="118" name="Shape 118"/>
         <p:cNvGrpSpPr/>
         <p:nvPr/>
       </p:nvGrpSpPr>
@@ -1407,7 +1407,7 @@
       </p:grpSpPr>
       <p:sp>
         <p:nvSpPr>
-          <p:cNvPr id="120" name="Google Shape;120;p6:notes"/>
+          <p:cNvPr id="119" name="Google Shape;119;p6:notes"/>
           <p:cNvSpPr txBox="1"/>
           <p:nvPr>
             <p:ph idx="1" type="body"/>
@@ -1454,7 +1454,7 @@
       </p:sp>
       <p:sp>
         <p:nvSpPr>
-          <p:cNvPr id="121" name="Google Shape;121;p6:notes"/>
+          <p:cNvPr id="120" name="Google Shape;120;p6:notes"/>
           <p:cNvSpPr/>
           <p:nvPr>
             <p:ph idx="2" type="sldImg"/>
@@ -1504,7 +1504,7 @@
   <p:cSld>
     <p:spTree>
       <p:nvGrpSpPr>
-        <p:cNvPr id="131" name="Shape 131"/>
+        <p:cNvPr id="130" name="Shape 130"/>
         <p:cNvGrpSpPr/>
         <p:nvPr/>
       </p:nvGrpSpPr>
@@ -1518,7 +1518,7 @@
       </p:grpSpPr>
       <p:sp>
         <p:nvSpPr>
-          <p:cNvPr id="132" name="Google Shape;132;p7:notes"/>
+          <p:cNvPr id="131" name="Google Shape;131;p7:notes"/>
           <p:cNvSpPr txBox="1"/>
           <p:nvPr>
             <p:ph idx="1" type="body"/>
@@ -1565,7 +1565,7 @@
       </p:sp>
       <p:sp>
         <p:nvSpPr>
-          <p:cNvPr id="133" name="Google Shape;133;p7:notes"/>
+          <p:cNvPr id="132" name="Google Shape;132;p7:notes"/>
           <p:cNvSpPr/>
           <p:nvPr>
             <p:ph idx="2" type="sldImg"/>
@@ -2104,7 +2104,7 @@
           <a:ln cap="flat" cmpd="sng" w="9525">
             <a:solidFill>
               <a:srgbClr val="FFFFFF">
-                <a:alpha val="50588"/>
+                <a:alpha val="50196"/>
               </a:srgbClr>
             </a:solidFill>
             <a:prstDash val="solid"/>
@@ -2492,7 +2492,7 @@
           <a:ln cap="flat" cmpd="sng" w="9525">
             <a:solidFill>
               <a:srgbClr val="FFFFFF">
-                <a:alpha val="50588"/>
+                <a:alpha val="50196"/>
               </a:srgbClr>
             </a:solidFill>
             <a:prstDash val="solid"/>
@@ -2717,285 +2717,6 @@
           <a:chExt cx="0" cy="0"/>
         </a:xfrm>
       </p:grpSpPr>
-      <p:sp>
-        <p:nvSpPr>
-          <p:cNvPr id="28" name="Google Shape;28;gd132618e38_0_53"/>
-          <p:cNvSpPr txBox="1"/>
-          <p:nvPr>
-            <p:ph idx="12" type="sldNum"/>
-          </p:nvPr>
-        </p:nvSpPr>
-        <p:spPr>
-          <a:xfrm>
-            <a:off x="8556784" y="4749851"/>
-            <a:ext cx="548700" cy="292500"/>
-          </a:xfrm>
-          <a:prstGeom prst="rect">
-            <a:avLst/>
-          </a:prstGeom>
-          <a:noFill/>
-          <a:ln>
-            <a:noFill/>
-          </a:ln>
-        </p:spPr>
-        <p:txBody>
-          <a:bodyPr anchorCtr="0" anchor="t" bIns="45700" lIns="45700" spcFirstLastPara="1" rIns="45700" wrap="square" tIns="45700">
-            <a:spAutoFit/>
-          </a:bodyPr>
-          <a:lstStyle>
-            <a:lvl1pPr indent="0" lvl="0" marL="0" marR="0" algn="r">
-              <a:lnSpc>
-                <a:spcPct val="100000"/>
-              </a:lnSpc>
-              <a:spcBef>
-                <a:spcPts val="0"/>
-              </a:spcBef>
-              <a:spcAft>
-                <a:spcPts val="0"/>
-              </a:spcAft>
-              <a:buClr>
-                <a:srgbClr val="FFFFFF"/>
-              </a:buClr>
-              <a:buSzPts val="600"/>
-              <a:buFont typeface="Rubik"/>
-              <a:buNone/>
-              <a:defRPr b="0" i="0" sz="1300" u="none" cap="none" strike="noStrike">
-                <a:solidFill>
-                  <a:srgbClr val="FFFFFF"/>
-                </a:solidFill>
-                <a:latin typeface="Calibri"/>
-                <a:ea typeface="Calibri"/>
-                <a:cs typeface="Calibri"/>
-                <a:sym typeface="Calibri"/>
-              </a:defRPr>
-            </a:lvl1pPr>
-            <a:lvl2pPr indent="0" lvl="1" marL="0" marR="0" algn="r">
-              <a:lnSpc>
-                <a:spcPct val="100000"/>
-              </a:lnSpc>
-              <a:spcBef>
-                <a:spcPts val="0"/>
-              </a:spcBef>
-              <a:spcAft>
-                <a:spcPts val="0"/>
-              </a:spcAft>
-              <a:buClr>
-                <a:srgbClr val="FFFFFF"/>
-              </a:buClr>
-              <a:buSzPts val="600"/>
-              <a:buFont typeface="Rubik"/>
-              <a:buNone/>
-              <a:defRPr b="0" i="0" sz="1300" u="none" cap="none" strike="noStrike">
-                <a:solidFill>
-                  <a:srgbClr val="FFFFFF"/>
-                </a:solidFill>
-                <a:latin typeface="Calibri"/>
-                <a:ea typeface="Calibri"/>
-                <a:cs typeface="Calibri"/>
-                <a:sym typeface="Calibri"/>
-              </a:defRPr>
-            </a:lvl2pPr>
-            <a:lvl3pPr indent="0" lvl="2" marL="0" marR="0" algn="r">
-              <a:lnSpc>
-                <a:spcPct val="100000"/>
-              </a:lnSpc>
-              <a:spcBef>
-                <a:spcPts val="0"/>
-              </a:spcBef>
-              <a:spcAft>
-                <a:spcPts val="0"/>
-              </a:spcAft>
-              <a:buClr>
-                <a:srgbClr val="FFFFFF"/>
-              </a:buClr>
-              <a:buSzPts val="600"/>
-              <a:buFont typeface="Rubik"/>
-              <a:buNone/>
-              <a:defRPr b="0" i="0" sz="1300" u="none" cap="none" strike="noStrike">
-                <a:solidFill>
-                  <a:srgbClr val="FFFFFF"/>
-                </a:solidFill>
-                <a:latin typeface="Calibri"/>
-                <a:ea typeface="Calibri"/>
-                <a:cs typeface="Calibri"/>
-                <a:sym typeface="Calibri"/>
-              </a:defRPr>
-            </a:lvl3pPr>
-            <a:lvl4pPr indent="0" lvl="3" marL="0" marR="0" algn="r">
-              <a:lnSpc>
-                <a:spcPct val="100000"/>
-              </a:lnSpc>
-              <a:spcBef>
-                <a:spcPts val="0"/>
-              </a:spcBef>
-              <a:spcAft>
-                <a:spcPts val="0"/>
-              </a:spcAft>
-              <a:buClr>
-                <a:srgbClr val="FFFFFF"/>
-              </a:buClr>
-              <a:buSzPts val="600"/>
-              <a:buFont typeface="Rubik"/>
-              <a:buNone/>
-              <a:defRPr b="0" i="0" sz="1300" u="none" cap="none" strike="noStrike">
-                <a:solidFill>
-                  <a:srgbClr val="FFFFFF"/>
-                </a:solidFill>
-                <a:latin typeface="Calibri"/>
-                <a:ea typeface="Calibri"/>
-                <a:cs typeface="Calibri"/>
-                <a:sym typeface="Calibri"/>
-              </a:defRPr>
-            </a:lvl4pPr>
-            <a:lvl5pPr indent="0" lvl="4" marL="0" marR="0" algn="r">
-              <a:lnSpc>
-                <a:spcPct val="100000"/>
-              </a:lnSpc>
-              <a:spcBef>
-                <a:spcPts val="0"/>
-              </a:spcBef>
-              <a:spcAft>
-                <a:spcPts val="0"/>
-              </a:spcAft>
-              <a:buClr>
-                <a:srgbClr val="FFFFFF"/>
-              </a:buClr>
-              <a:buSzPts val="600"/>
-              <a:buFont typeface="Rubik"/>
-              <a:buNone/>
-              <a:defRPr b="0" i="0" sz="1300" u="none" cap="none" strike="noStrike">
-                <a:solidFill>
-                  <a:srgbClr val="FFFFFF"/>
-                </a:solidFill>
-                <a:latin typeface="Calibri"/>
-                <a:ea typeface="Calibri"/>
-                <a:cs typeface="Calibri"/>
-                <a:sym typeface="Calibri"/>
-              </a:defRPr>
-            </a:lvl5pPr>
-            <a:lvl6pPr indent="0" lvl="5" marL="0" marR="0" algn="r">
-              <a:lnSpc>
-                <a:spcPct val="100000"/>
-              </a:lnSpc>
-              <a:spcBef>
-                <a:spcPts val="0"/>
-              </a:spcBef>
-              <a:spcAft>
-                <a:spcPts val="0"/>
-              </a:spcAft>
-              <a:buClr>
-                <a:srgbClr val="FFFFFF"/>
-              </a:buClr>
-              <a:buSzPts val="600"/>
-              <a:buFont typeface="Rubik"/>
-              <a:buNone/>
-              <a:defRPr b="0" i="0" sz="1300" u="none" cap="none" strike="noStrike">
-                <a:solidFill>
-                  <a:srgbClr val="FFFFFF"/>
-                </a:solidFill>
-                <a:latin typeface="Calibri"/>
-                <a:ea typeface="Calibri"/>
-                <a:cs typeface="Calibri"/>
-                <a:sym typeface="Calibri"/>
-              </a:defRPr>
-            </a:lvl6pPr>
-            <a:lvl7pPr indent="0" lvl="6" marL="0" marR="0" algn="r">
-              <a:lnSpc>
-                <a:spcPct val="100000"/>
-              </a:lnSpc>
-              <a:spcBef>
-                <a:spcPts val="0"/>
-              </a:spcBef>
-              <a:spcAft>
-                <a:spcPts val="0"/>
-              </a:spcAft>
-              <a:buClr>
-                <a:srgbClr val="FFFFFF"/>
-              </a:buClr>
-              <a:buSzPts val="600"/>
-              <a:buFont typeface="Rubik"/>
-              <a:buNone/>
-              <a:defRPr b="0" i="0" sz="1300" u="none" cap="none" strike="noStrike">
-                <a:solidFill>
-                  <a:srgbClr val="FFFFFF"/>
-                </a:solidFill>
-                <a:latin typeface="Calibri"/>
-                <a:ea typeface="Calibri"/>
-                <a:cs typeface="Calibri"/>
-                <a:sym typeface="Calibri"/>
-              </a:defRPr>
-            </a:lvl7pPr>
-            <a:lvl8pPr indent="0" lvl="7" marL="0" marR="0" algn="r">
-              <a:lnSpc>
-                <a:spcPct val="100000"/>
-              </a:lnSpc>
-              <a:spcBef>
-                <a:spcPts val="0"/>
-              </a:spcBef>
-              <a:spcAft>
-                <a:spcPts val="0"/>
-              </a:spcAft>
-              <a:buClr>
-                <a:srgbClr val="FFFFFF"/>
-              </a:buClr>
-              <a:buSzPts val="600"/>
-              <a:buFont typeface="Rubik"/>
-              <a:buNone/>
-              <a:defRPr b="0" i="0" sz="1300" u="none" cap="none" strike="noStrike">
-                <a:solidFill>
-                  <a:srgbClr val="FFFFFF"/>
-                </a:solidFill>
-                <a:latin typeface="Calibri"/>
-                <a:ea typeface="Calibri"/>
-                <a:cs typeface="Calibri"/>
-                <a:sym typeface="Calibri"/>
-              </a:defRPr>
-            </a:lvl8pPr>
-            <a:lvl9pPr indent="0" lvl="8" marL="0" marR="0" algn="r">
-              <a:lnSpc>
-                <a:spcPct val="100000"/>
-              </a:lnSpc>
-              <a:spcBef>
-                <a:spcPts val="0"/>
-              </a:spcBef>
-              <a:spcAft>
-                <a:spcPts val="0"/>
-              </a:spcAft>
-              <a:buClr>
-                <a:srgbClr val="FFFFFF"/>
-              </a:buClr>
-              <a:buSzPts val="600"/>
-              <a:buFont typeface="Rubik"/>
-              <a:buNone/>
-              <a:defRPr b="0" i="0" sz="1300" u="none" cap="none" strike="noStrike">
-                <a:solidFill>
-                  <a:srgbClr val="FFFFFF"/>
-                </a:solidFill>
-                <a:latin typeface="Calibri"/>
-                <a:ea typeface="Calibri"/>
-                <a:cs typeface="Calibri"/>
-                <a:sym typeface="Calibri"/>
-              </a:defRPr>
-            </a:lvl9pPr>
-          </a:lstStyle>
-          <a:p>
-            <a:pPr indent="0" lvl="0" marL="0" rtl="0" algn="r">
-              <a:spcBef>
-                <a:spcPts val="0"/>
-              </a:spcBef>
-              <a:spcAft>
-                <a:spcPts val="0"/>
-              </a:spcAft>
-              <a:buNone/>
-            </a:pPr>
-            <a:fld id="{00000000-1234-1234-1234-123412341234}" type="slidenum">
-              <a:rPr lang="en-US"/>
-              <a:t>‹#›</a:t>
-            </a:fld>
-            <a:endParaRPr/>
-          </a:p>
-        </p:txBody>
-      </p:sp>
     </p:spTree>
   </p:cSld>
   <p:clrMapOvr>
@@ -3037,7 +2758,7 @@
   <p:cSld name="Title Slide 1">
     <p:spTree>
       <p:nvGrpSpPr>
-        <p:cNvPr id="29" name="Shape 29"/>
+        <p:cNvPr id="28" name="Shape 28"/>
         <p:cNvGrpSpPr/>
         <p:nvPr/>
       </p:nvGrpSpPr>
@@ -3051,7 +2772,7 @@
       </p:grpSpPr>
       <p:pic>
         <p:nvPicPr>
-          <p:cNvPr descr="Picture 5" id="30" name="Google Shape;30;gd132618e38_0_7"/>
+          <p:cNvPr descr="Picture 5" id="29" name="Google Shape;29;gd132618e38_0_7"/>
           <p:cNvPicPr preferRelativeResize="0"/>
           <p:nvPr/>
         </p:nvPicPr>
@@ -3078,7 +2799,7 @@
       </p:pic>
       <p:pic>
         <p:nvPicPr>
-          <p:cNvPr descr="Picture 10" id="31" name="Google Shape;31;gd132618e38_0_7"/>
+          <p:cNvPr descr="Picture 10" id="30" name="Google Shape;30;gd132618e38_0_7"/>
           <p:cNvPicPr preferRelativeResize="0"/>
           <p:nvPr/>
         </p:nvPicPr>
@@ -3105,7 +2826,7 @@
       </p:pic>
       <p:pic>
         <p:nvPicPr>
-          <p:cNvPr descr="Picture 11" id="32" name="Google Shape;32;gd132618e38_0_7"/>
+          <p:cNvPr descr="Picture 11" id="31" name="Google Shape;31;gd132618e38_0_7"/>
           <p:cNvPicPr preferRelativeResize="0"/>
           <p:nvPr/>
         </p:nvPicPr>
@@ -3132,7 +2853,7 @@
       </p:pic>
       <p:sp>
         <p:nvSpPr>
-          <p:cNvPr id="33" name="Google Shape;33;gd132618e38_0_7"/>
+          <p:cNvPr id="32" name="Google Shape;32;gd132618e38_0_7"/>
           <p:cNvSpPr txBox="1"/>
           <p:nvPr>
             <p:ph idx="1" type="body"/>
@@ -3333,7 +3054,7 @@
       </p:sp>
       <p:cxnSp>
         <p:nvCxnSpPr>
-          <p:cNvPr id="34" name="Google Shape;34;gd132618e38_0_7"/>
+          <p:cNvPr id="33" name="Google Shape;33;gd132618e38_0_7"/>
           <p:cNvCxnSpPr/>
           <p:nvPr/>
         </p:nvCxnSpPr>
@@ -3349,7 +3070,7 @@
           <a:ln cap="flat" cmpd="sng" w="9525">
             <a:solidFill>
               <a:srgbClr val="FFFFFF">
-                <a:alpha val="50588"/>
+                <a:alpha val="50196"/>
               </a:srgbClr>
             </a:solidFill>
             <a:prstDash val="solid"/>
@@ -3361,7 +3082,7 @@
       </p:cxnSp>
       <p:sp>
         <p:nvSpPr>
-          <p:cNvPr id="35" name="Google Shape;35;gd132618e38_0_7"/>
+          <p:cNvPr id="34" name="Google Shape;34;gd132618e38_0_7"/>
           <p:cNvSpPr txBox="1"/>
           <p:nvPr>
             <p:ph idx="12" type="sldNum"/>
@@ -3640,7 +3361,7 @@
       </p:sp>
       <p:pic>
         <p:nvPicPr>
-          <p:cNvPr descr="Shape, rectangle&#10;&#10;Description automatically generated" id="36" name="Google Shape;36;gd132618e38_0_7"/>
+          <p:cNvPr descr="Shape, rectangle&#10;&#10;Description automatically generated" id="35" name="Google Shape;35;gd132618e38_0_7"/>
           <p:cNvPicPr preferRelativeResize="0"/>
           <p:nvPr/>
         </p:nvPicPr>
@@ -3667,7 +3388,7 @@
       </p:pic>
       <p:pic>
         <p:nvPicPr>
-          <p:cNvPr descr="Background pattern&#10;&#10;Description automatically generated" id="37" name="Google Shape;37;gd132618e38_0_7"/>
+          <p:cNvPr descr="Background pattern&#10;&#10;Description automatically generated" id="36" name="Google Shape;36;gd132618e38_0_7"/>
           <p:cNvPicPr preferRelativeResize="0"/>
           <p:nvPr/>
         </p:nvPicPr>
@@ -3694,7 +3415,7 @@
       </p:pic>
       <p:pic>
         <p:nvPicPr>
-          <p:cNvPr descr="A picture containing text, clipart&#10;&#10;Description automatically generated" id="38" name="Google Shape;38;gd132618e38_0_7"/>
+          <p:cNvPr descr="A picture containing text, clipart&#10;&#10;Description automatically generated" id="37" name="Google Shape;37;gd132618e38_0_7"/>
           <p:cNvPicPr preferRelativeResize="0"/>
           <p:nvPr/>
         </p:nvPicPr>
@@ -3721,7 +3442,7 @@
       </p:pic>
       <p:sp>
         <p:nvSpPr>
-          <p:cNvPr id="39" name="Google Shape;39;gd132618e38_0_7"/>
+          <p:cNvPr id="38" name="Google Shape;38;gd132618e38_0_7"/>
           <p:cNvSpPr txBox="1"/>
           <p:nvPr>
             <p:ph idx="2" type="subTitle"/>
@@ -3885,7 +3606,7 @@
       </p:sp>
       <p:sp>
         <p:nvSpPr>
-          <p:cNvPr id="40" name="Google Shape;40;gd132618e38_0_7"/>
+          <p:cNvPr id="39" name="Google Shape;39;gd132618e38_0_7"/>
           <p:cNvSpPr txBox="1"/>
           <p:nvPr/>
         </p:nvSpPr>
@@ -3942,7 +3663,7 @@
       </p:sp>
       <p:cxnSp>
         <p:nvCxnSpPr>
-          <p:cNvPr id="41" name="Google Shape;41;gd132618e38_0_7"/>
+          <p:cNvPr id="40" name="Google Shape;40;gd132618e38_0_7"/>
           <p:cNvCxnSpPr/>
           <p:nvPr/>
         </p:nvCxnSpPr>
@@ -3958,7 +3679,7 @@
           <a:ln cap="flat" cmpd="sng" w="9525">
             <a:solidFill>
               <a:schemeClr val="lt1">
-                <a:alpha val="50588"/>
+                <a:alpha val="50196"/>
               </a:schemeClr>
             </a:solidFill>
             <a:prstDash val="solid"/>
@@ -3970,7 +3691,7 @@
       </p:cxnSp>
       <p:sp>
         <p:nvSpPr>
-          <p:cNvPr id="42" name="Google Shape;42;gd132618e38_0_7"/>
+          <p:cNvPr id="41" name="Google Shape;41;gd132618e38_0_7"/>
           <p:cNvSpPr txBox="1"/>
           <p:nvPr>
             <p:ph idx="3" type="body"/>
@@ -4137,7 +3858,7 @@
   <p:cSld name="TITLE_AND_BODY">
     <p:spTree>
       <p:nvGrpSpPr>
-        <p:cNvPr id="43" name="Shape 43"/>
+        <p:cNvPr id="42" name="Shape 42"/>
         <p:cNvGrpSpPr/>
         <p:nvPr/>
       </p:nvGrpSpPr>
@@ -4151,7 +3872,7 @@
       </p:grpSpPr>
       <p:pic>
         <p:nvPicPr>
-          <p:cNvPr descr="Picture 3" id="44" name="Google Shape;44;gd132618e38_0_21"/>
+          <p:cNvPr descr="Picture 3" id="43" name="Google Shape;43;gd132618e38_0_21"/>
           <p:cNvPicPr preferRelativeResize="0"/>
           <p:nvPr/>
         </p:nvPicPr>
@@ -4178,7 +3899,7 @@
       </p:pic>
       <p:sp>
         <p:nvSpPr>
-          <p:cNvPr id="45" name="Google Shape;45;gd132618e38_0_21"/>
+          <p:cNvPr id="44" name="Google Shape;44;gd132618e38_0_21"/>
           <p:cNvSpPr txBox="1"/>
           <p:nvPr>
             <p:ph type="title"/>
@@ -4366,7 +4087,7 @@
       </p:sp>
       <p:sp>
         <p:nvSpPr>
-          <p:cNvPr id="46" name="Google Shape;46;gd132618e38_0_21"/>
+          <p:cNvPr id="45" name="Google Shape;45;gd132618e38_0_21"/>
           <p:cNvSpPr txBox="1"/>
           <p:nvPr>
             <p:ph idx="12" type="sldNum"/>
@@ -4656,7 +4377,7 @@
   <p:cSld name="InfluxDays - Content Dark">
     <p:spTree>
       <p:nvGrpSpPr>
-        <p:cNvPr id="47" name="Shape 47"/>
+        <p:cNvPr id="46" name="Shape 46"/>
         <p:cNvGrpSpPr/>
         <p:nvPr/>
       </p:nvGrpSpPr>
@@ -4670,7 +4391,7 @@
       </p:grpSpPr>
       <p:sp>
         <p:nvSpPr>
-          <p:cNvPr id="48" name="Google Shape;48;gd132618e38_0_25"/>
+          <p:cNvPr id="47" name="Google Shape;47;gd132618e38_0_25"/>
           <p:cNvSpPr txBox="1"/>
           <p:nvPr>
             <p:ph type="title"/>
@@ -4853,7 +4574,7 @@
       </p:sp>
       <p:sp>
         <p:nvSpPr>
-          <p:cNvPr id="49" name="Google Shape;49;gd132618e38_0_25"/>
+          <p:cNvPr id="48" name="Google Shape;48;gd132618e38_0_25"/>
           <p:cNvSpPr txBox="1"/>
           <p:nvPr>
             <p:ph idx="1" type="body"/>
@@ -5009,7 +4730,7 @@
       </p:sp>
       <p:sp>
         <p:nvSpPr>
-          <p:cNvPr id="50" name="Google Shape;50;gd132618e38_0_25"/>
+          <p:cNvPr id="49" name="Google Shape;49;gd132618e38_0_25"/>
           <p:cNvSpPr txBox="1"/>
           <p:nvPr>
             <p:ph idx="12" type="sldNum"/>
@@ -5306,7 +5027,7 @@
     </p:bg>
     <p:spTree>
       <p:nvGrpSpPr>
-        <p:cNvPr id="51" name="Shape 51"/>
+        <p:cNvPr id="50" name="Shape 50"/>
         <p:cNvGrpSpPr/>
         <p:nvPr/>
       </p:nvGrpSpPr>
@@ -5320,7 +5041,7 @@
       </p:grpSpPr>
       <p:sp>
         <p:nvSpPr>
-          <p:cNvPr id="52" name="Google Shape;52;gd132618e38_0_29"/>
+          <p:cNvPr id="51" name="Google Shape;51;gd132618e38_0_29"/>
           <p:cNvSpPr txBox="1"/>
           <p:nvPr>
             <p:ph type="title"/>
@@ -5503,7 +5224,7 @@
       </p:sp>
       <p:sp>
         <p:nvSpPr>
-          <p:cNvPr id="53" name="Google Shape;53;gd132618e38_0_29"/>
+          <p:cNvPr id="52" name="Google Shape;52;gd132618e38_0_29"/>
           <p:cNvSpPr txBox="1"/>
           <p:nvPr>
             <p:ph idx="12" type="sldNum"/>
@@ -5793,7 +5514,7 @@
   <p:cSld name="1_Title Slide 1">
     <p:spTree>
       <p:nvGrpSpPr>
-        <p:cNvPr id="54" name="Shape 54"/>
+        <p:cNvPr id="53" name="Shape 53"/>
         <p:cNvGrpSpPr/>
         <p:nvPr/>
       </p:nvGrpSpPr>
@@ -5807,7 +5528,7 @@
       </p:grpSpPr>
       <p:pic>
         <p:nvPicPr>
-          <p:cNvPr descr="Picture 5" id="55" name="Google Shape;55;gd132618e38_0_32"/>
+          <p:cNvPr descr="Picture 5" id="54" name="Google Shape;54;gd132618e38_0_32"/>
           <p:cNvPicPr preferRelativeResize="0"/>
           <p:nvPr/>
         </p:nvPicPr>
@@ -5834,7 +5555,7 @@
       </p:pic>
       <p:pic>
         <p:nvPicPr>
-          <p:cNvPr descr="Picture 10" id="56" name="Google Shape;56;gd132618e38_0_32"/>
+          <p:cNvPr descr="Picture 10" id="55" name="Google Shape;55;gd132618e38_0_32"/>
           <p:cNvPicPr preferRelativeResize="0"/>
           <p:nvPr/>
         </p:nvPicPr>
@@ -5861,7 +5582,7 @@
       </p:pic>
       <p:pic>
         <p:nvPicPr>
-          <p:cNvPr descr="Picture 11" id="57" name="Google Shape;57;gd132618e38_0_32"/>
+          <p:cNvPr descr="Picture 11" id="56" name="Google Shape;56;gd132618e38_0_32"/>
           <p:cNvPicPr preferRelativeResize="0"/>
           <p:nvPr/>
         </p:nvPicPr>
@@ -5888,7 +5609,7 @@
       </p:pic>
       <p:sp>
         <p:nvSpPr>
-          <p:cNvPr id="58" name="Google Shape;58;gd132618e38_0_32"/>
+          <p:cNvPr id="57" name="Google Shape;57;gd132618e38_0_32"/>
           <p:cNvSpPr txBox="1"/>
           <p:nvPr>
             <p:ph idx="1" type="body"/>
@@ -6101,7 +5822,7 @@
       </p:sp>
       <p:cxnSp>
         <p:nvCxnSpPr>
-          <p:cNvPr id="59" name="Google Shape;59;gd132618e38_0_32"/>
+          <p:cNvPr id="58" name="Google Shape;58;gd132618e38_0_32"/>
           <p:cNvCxnSpPr/>
           <p:nvPr/>
         </p:nvCxnSpPr>
@@ -6117,7 +5838,7 @@
           <a:ln cap="flat" cmpd="sng" w="9525">
             <a:solidFill>
               <a:srgbClr val="FFFFFF">
-                <a:alpha val="50588"/>
+                <a:alpha val="50196"/>
               </a:srgbClr>
             </a:solidFill>
             <a:prstDash val="solid"/>
@@ -6129,7 +5850,7 @@
       </p:cxnSp>
       <p:sp>
         <p:nvSpPr>
-          <p:cNvPr id="60" name="Google Shape;60;gd132618e38_0_32"/>
+          <p:cNvPr id="59" name="Google Shape;59;gd132618e38_0_32"/>
           <p:cNvSpPr txBox="1"/>
           <p:nvPr>
             <p:ph idx="12" type="sldNum"/>
@@ -6408,7 +6129,7 @@
       </p:sp>
       <p:pic>
         <p:nvPicPr>
-          <p:cNvPr descr="Shape, rectangle&#10;&#10;Description automatically generated" id="61" name="Google Shape;61;gd132618e38_0_32"/>
+          <p:cNvPr descr="Shape, rectangle&#10;&#10;Description automatically generated" id="60" name="Google Shape;60;gd132618e38_0_32"/>
           <p:cNvPicPr preferRelativeResize="0"/>
           <p:nvPr/>
         </p:nvPicPr>
@@ -6435,7 +6156,7 @@
       </p:pic>
       <p:pic>
         <p:nvPicPr>
-          <p:cNvPr descr="Background pattern&#10;&#10;Description automatically generated" id="62" name="Google Shape;62;gd132618e38_0_32"/>
+          <p:cNvPr descr="Background pattern&#10;&#10;Description automatically generated" id="61" name="Google Shape;61;gd132618e38_0_32"/>
           <p:cNvPicPr preferRelativeResize="0"/>
           <p:nvPr/>
         </p:nvPicPr>
@@ -6462,7 +6183,7 @@
       </p:pic>
       <p:pic>
         <p:nvPicPr>
-          <p:cNvPr descr="A picture containing text, clipart&#10;&#10;Description automatically generated" id="63" name="Google Shape;63;gd132618e38_0_32"/>
+          <p:cNvPr descr="A picture containing text, clipart&#10;&#10;Description automatically generated" id="62" name="Google Shape;62;gd132618e38_0_32"/>
           <p:cNvPicPr preferRelativeResize="0"/>
           <p:nvPr/>
         </p:nvPicPr>
@@ -6489,7 +6210,7 @@
       </p:pic>
       <p:sp>
         <p:nvSpPr>
-          <p:cNvPr id="64" name="Google Shape;64;gd132618e38_0_32"/>
+          <p:cNvPr id="63" name="Google Shape;63;gd132618e38_0_32"/>
           <p:cNvSpPr txBox="1"/>
           <p:nvPr>
             <p:ph idx="2" type="subTitle"/>
@@ -6680,7 +6401,7 @@
       </p:sp>
       <p:sp>
         <p:nvSpPr>
-          <p:cNvPr id="65" name="Google Shape;65;gd132618e38_0_32"/>
+          <p:cNvPr id="64" name="Google Shape;64;gd132618e38_0_32"/>
           <p:cNvSpPr txBox="1"/>
           <p:nvPr/>
         </p:nvSpPr>
@@ -6737,7 +6458,7 @@
       </p:sp>
       <p:cxnSp>
         <p:nvCxnSpPr>
-          <p:cNvPr id="66" name="Google Shape;66;gd132618e38_0_32"/>
+          <p:cNvPr id="65" name="Google Shape;65;gd132618e38_0_32"/>
           <p:cNvCxnSpPr/>
           <p:nvPr/>
         </p:nvCxnSpPr>
@@ -6753,7 +6474,7 @@
           <a:ln cap="flat" cmpd="sng" w="9525">
             <a:solidFill>
               <a:schemeClr val="lt1">
-                <a:alpha val="50588"/>
+                <a:alpha val="50196"/>
               </a:schemeClr>
             </a:solidFill>
             <a:prstDash val="solid"/>
@@ -6765,7 +6486,7 @@
       </p:cxnSp>
       <p:sp>
         <p:nvSpPr>
-          <p:cNvPr id="67" name="Google Shape;67;gd132618e38_0_32"/>
+          <p:cNvPr id="66" name="Google Shape;66;gd132618e38_0_32"/>
           <p:cNvSpPr txBox="1"/>
           <p:nvPr>
             <p:ph idx="3" type="body"/>
@@ -6966,7 +6687,7 @@
     </p:bg>
     <p:spTree>
       <p:nvGrpSpPr>
-        <p:cNvPr id="68" name="Shape 68"/>
+        <p:cNvPr id="67" name="Shape 67"/>
         <p:cNvGrpSpPr/>
         <p:nvPr/>
       </p:nvGrpSpPr>
@@ -6980,7 +6701,7 @@
       </p:grpSpPr>
       <p:sp>
         <p:nvSpPr>
-          <p:cNvPr id="69" name="Google Shape;69;gd132618e38_0_46"/>
+          <p:cNvPr id="68" name="Google Shape;68;gd132618e38_0_46"/>
           <p:cNvSpPr txBox="1"/>
           <p:nvPr>
             <p:ph idx="1" type="subTitle"/>
@@ -7171,7 +6892,7 @@
       </p:sp>
       <p:sp>
         <p:nvSpPr>
-          <p:cNvPr id="70" name="Google Shape;70;gd132618e38_0_46"/>
+          <p:cNvPr id="69" name="Google Shape;69;gd132618e38_0_46"/>
           <p:cNvSpPr txBox="1"/>
           <p:nvPr>
             <p:ph type="title"/>
@@ -7339,7 +7060,7 @@
       </p:sp>
       <p:pic>
         <p:nvPicPr>
-          <p:cNvPr descr="Shape, rectangle&#10;&#10;Description automatically generated" id="71" name="Google Shape;71;gd132618e38_0_46"/>
+          <p:cNvPr descr="Shape, rectangle&#10;&#10;Description automatically generated" id="70" name="Google Shape;70;gd132618e38_0_46"/>
           <p:cNvPicPr preferRelativeResize="0"/>
           <p:nvPr/>
         </p:nvPicPr>
@@ -7366,7 +7087,7 @@
       </p:pic>
       <p:pic>
         <p:nvPicPr>
-          <p:cNvPr descr="A picture containing text, clipart&#10;&#10;Description automatically generated" id="72" name="Google Shape;72;gd132618e38_0_46"/>
+          <p:cNvPr descr="A picture containing text, clipart&#10;&#10;Description automatically generated" id="71" name="Google Shape;71;gd132618e38_0_46"/>
           <p:cNvPicPr preferRelativeResize="0"/>
           <p:nvPr/>
         </p:nvPicPr>
@@ -7393,7 +7114,7 @@
       </p:pic>
       <p:pic>
         <p:nvPicPr>
-          <p:cNvPr descr="Background pattern&#10;&#10;Description automatically generated" id="73" name="Google Shape;73;gd132618e38_0_46"/>
+          <p:cNvPr descr="Background pattern&#10;&#10;Description automatically generated" id="72" name="Google Shape;72;gd132618e38_0_46"/>
           <p:cNvPicPr preferRelativeResize="0"/>
           <p:nvPr/>
         </p:nvPicPr>
@@ -7420,7 +7141,7 @@
       </p:pic>
       <p:sp>
         <p:nvSpPr>
-          <p:cNvPr id="74" name="Google Shape;74;gd132618e38_0_46"/>
+          <p:cNvPr id="73" name="Google Shape;73;gd132618e38_0_46"/>
           <p:cNvSpPr txBox="1"/>
           <p:nvPr>
             <p:ph idx="12" type="sldNum"/>
@@ -7792,8 +7513,8 @@
         </p:nvSpPr>
         <p:spPr>
           <a:xfrm>
-            <a:off x="3914936" y="4889489"/>
-            <a:ext cx="1314000" cy="184800"/>
+            <a:off x="3773148" y="4889500"/>
+            <a:ext cx="1589100" cy="92400"/>
           </a:xfrm>
           <a:prstGeom prst="rect">
             <a:avLst/>
@@ -9437,7 +9158,7 @@
   <p:cSld>
     <p:spTree>
       <p:nvGrpSpPr>
-        <p:cNvPr id="78" name="Shape 78"/>
+        <p:cNvPr id="77" name="Shape 77"/>
         <p:cNvGrpSpPr/>
         <p:nvPr/>
       </p:nvGrpSpPr>
@@ -9451,7 +9172,7 @@
       </p:grpSpPr>
       <p:sp>
         <p:nvSpPr>
-          <p:cNvPr id="79" name="Google Shape;79;p1"/>
+          <p:cNvPr id="78" name="Google Shape;78;p1"/>
           <p:cNvSpPr txBox="1"/>
           <p:nvPr>
             <p:ph idx="4294967295" type="title"/>
@@ -9511,14 +9232,14 @@
       </p:sp>
       <p:sp>
         <p:nvSpPr>
-          <p:cNvPr id="80" name="Google Shape;80;p1"/>
+          <p:cNvPr id="79" name="Google Shape;79;p1"/>
           <p:cNvSpPr txBox="1"/>
           <p:nvPr/>
         </p:nvSpPr>
         <p:spPr>
           <a:xfrm>
             <a:off x="711705" y="3507707"/>
-            <a:ext cx="5297138" cy="1328879"/>
+            <a:ext cx="5297100" cy="1400700"/>
           </a:xfrm>
           <a:prstGeom prst="rect">
             <a:avLst/>
@@ -9792,7 +9513,7 @@
               <a:buNone/>
             </a:pPr>
             <a:r>
-              <a:rPr b="0" i="0" lang="en-US" sz="1300" u="none" cap="none" strike="noStrike">
+              <a:rPr lang="en-US" sz="1300">
                 <a:solidFill>
                   <a:srgbClr val="FFFFFF"/>
                 </a:solidFill>
@@ -9801,7 +9522,7 @@
                 <a:cs typeface="Helvetica Neue"/>
                 <a:sym typeface="Helvetica Neue"/>
               </a:rPr>
-              <a:t>Prof. @ University of Tartu</a:t>
+              <a:t>Prof. @ INSA Lyon (France)</a:t>
             </a:r>
             <a:endParaRPr b="0" i="0" sz="1400" u="none" cap="none" strike="noStrike">
               <a:solidFill>
@@ -9828,7 +9549,7 @@
   <p:cSld>
     <p:spTree>
       <p:nvGrpSpPr>
-        <p:cNvPr id="84" name="Shape 84"/>
+        <p:cNvPr id="83" name="Shape 83"/>
         <p:cNvGrpSpPr/>
         <p:nvPr/>
       </p:nvGrpSpPr>
@@ -9842,7 +9563,7 @@
       </p:grpSpPr>
       <p:sp>
         <p:nvSpPr>
-          <p:cNvPr id="85" name="Google Shape;85;p2"/>
+          <p:cNvPr id="84" name="Google Shape;84;p2"/>
           <p:cNvSpPr txBox="1"/>
           <p:nvPr>
             <p:ph idx="4294967295" type="title"/>
@@ -9902,7 +9623,7 @@
       </p:sp>
       <p:sp>
         <p:nvSpPr>
-          <p:cNvPr id="86" name="Google Shape;86;p2"/>
+          <p:cNvPr id="85" name="Google Shape;85;p2"/>
           <p:cNvSpPr txBox="1"/>
           <p:nvPr>
             <p:ph idx="4294967295" type="sldNum"/>
@@ -9910,7 +9631,7 @@
         </p:nvSpPr>
         <p:spPr>
           <a:xfrm>
-            <a:off x="8763625" y="4785937"/>
+            <a:off x="8852975" y="4785937"/>
             <a:ext cx="203100" cy="184800"/>
           </a:xfrm>
           <a:prstGeom prst="rect">
@@ -9950,7 +9671,7 @@
       </p:sp>
       <p:pic>
         <p:nvPicPr>
-          <p:cNvPr descr="Picture 4" id="87" name="Google Shape;87;p2"/>
+          <p:cNvPr descr="Picture 4" id="86" name="Google Shape;86;p2"/>
           <p:cNvPicPr preferRelativeResize="0"/>
           <p:nvPr/>
         </p:nvPicPr>
@@ -9958,7 +9679,7 @@
           <a:blip r:embed="rId3">
             <a:alphaModFix/>
           </a:blip>
-          <a:srcRect b="0" l="20414" r="8326" t="0"/>
+          <a:srcRect b="0" l="20413" r="8326" t="0"/>
           <a:stretch/>
         </p:blipFill>
         <p:spPr>
@@ -10000,7 +9721,7 @@
   <p:cSld>
     <p:spTree>
       <p:nvGrpSpPr>
-        <p:cNvPr id="91" name="Shape 91"/>
+        <p:cNvPr id="90" name="Shape 90"/>
         <p:cNvGrpSpPr/>
         <p:nvPr/>
       </p:nvGrpSpPr>
@@ -10014,7 +9735,7 @@
       </p:grpSpPr>
       <p:sp>
         <p:nvSpPr>
-          <p:cNvPr id="92" name="Google Shape;92;p3"/>
+          <p:cNvPr id="91" name="Google Shape;91;p3"/>
           <p:cNvSpPr txBox="1"/>
           <p:nvPr>
             <p:ph idx="4294967295" type="title"/>
@@ -10074,7 +9795,7 @@
       </p:sp>
       <p:sp>
         <p:nvSpPr>
-          <p:cNvPr id="93" name="Google Shape;93;p3"/>
+          <p:cNvPr id="92" name="Google Shape;92;p3"/>
           <p:cNvSpPr txBox="1"/>
           <p:nvPr>
             <p:ph idx="4294967295" type="sldNum"/>
@@ -10082,7 +9803,7 @@
         </p:nvSpPr>
         <p:spPr>
           <a:xfrm>
-            <a:off x="8784125" y="4786012"/>
+            <a:off x="8857375" y="4786012"/>
             <a:ext cx="203100" cy="184800"/>
           </a:xfrm>
           <a:prstGeom prst="rect">
@@ -10122,7 +9843,7 @@
       </p:sp>
       <p:pic>
         <p:nvPicPr>
-          <p:cNvPr descr="Picture 4" id="94" name="Google Shape;94;p3"/>
+          <p:cNvPr descr="Picture 4" id="93" name="Google Shape;93;p3"/>
           <p:cNvPicPr preferRelativeResize="0"/>
           <p:nvPr/>
         </p:nvPicPr>
@@ -10172,7 +9893,7 @@
   <p:cSld>
     <p:spTree>
       <p:nvGrpSpPr>
-        <p:cNvPr id="98" name="Shape 98"/>
+        <p:cNvPr id="97" name="Shape 97"/>
         <p:cNvGrpSpPr/>
         <p:nvPr/>
       </p:nvGrpSpPr>
@@ -10186,7 +9907,7 @@
       </p:grpSpPr>
       <p:sp>
         <p:nvSpPr>
-          <p:cNvPr id="99" name="Google Shape;99;p4"/>
+          <p:cNvPr id="98" name="Google Shape;98;p4"/>
           <p:cNvSpPr txBox="1"/>
           <p:nvPr>
             <p:ph idx="4294967295" type="title"/>
@@ -10246,7 +9967,7 @@
       </p:sp>
       <p:sp>
         <p:nvSpPr>
-          <p:cNvPr id="100" name="Google Shape;100;p4"/>
+          <p:cNvPr id="99" name="Google Shape;99;p4"/>
           <p:cNvSpPr txBox="1"/>
           <p:nvPr>
             <p:ph idx="4294967295" type="sldNum"/>
@@ -10254,7 +9975,7 @@
         </p:nvSpPr>
         <p:spPr>
           <a:xfrm>
-            <a:off x="8712550" y="4776637"/>
+            <a:off x="8873750" y="4769312"/>
             <a:ext cx="203100" cy="184800"/>
           </a:xfrm>
           <a:prstGeom prst="rect">
@@ -10294,7 +10015,7 @@
       </p:sp>
       <p:pic>
         <p:nvPicPr>
-          <p:cNvPr descr="Picture 2" id="101" name="Google Shape;101;p4"/>
+          <p:cNvPr descr="Picture 2" id="100" name="Google Shape;100;p4"/>
           <p:cNvPicPr preferRelativeResize="0"/>
           <p:nvPr/>
         </p:nvPicPr>
@@ -10321,7 +10042,7 @@
       </p:pic>
       <p:grpSp>
         <p:nvGrpSpPr>
-          <p:cNvPr id="102" name="Google Shape;102;p4"/>
+          <p:cNvPr id="101" name="Google Shape;101;p4"/>
           <p:cNvGrpSpPr/>
           <p:nvPr/>
         </p:nvGrpSpPr>
@@ -10335,7 +10056,7 @@
         </p:grpSpPr>
         <p:sp>
           <p:nvSpPr>
-            <p:cNvPr id="103" name="Google Shape;103;p4"/>
+            <p:cNvPr id="102" name="Google Shape;102;p4"/>
             <p:cNvSpPr/>
             <p:nvPr/>
           </p:nvSpPr>
@@ -10394,7 +10115,7 @@
         </p:sp>
         <p:sp>
           <p:nvSpPr>
-            <p:cNvPr id="104" name="Google Shape;104;p4"/>
+            <p:cNvPr id="103" name="Google Shape;103;p4"/>
             <p:cNvSpPr txBox="1"/>
             <p:nvPr/>
           </p:nvSpPr>
@@ -10484,7 +10205,7 @@
   <p:cSld>
     <p:spTree>
       <p:nvGrpSpPr>
-        <p:cNvPr id="108" name="Shape 108"/>
+        <p:cNvPr id="107" name="Shape 107"/>
         <p:cNvGrpSpPr/>
         <p:nvPr/>
       </p:nvGrpSpPr>
@@ -10498,7 +10219,7 @@
       </p:grpSpPr>
       <p:sp>
         <p:nvSpPr>
-          <p:cNvPr id="109" name="Google Shape;109;p5"/>
+          <p:cNvPr id="108" name="Google Shape;108;p5"/>
           <p:cNvSpPr txBox="1"/>
           <p:nvPr>
             <p:ph idx="4294967295" type="title"/>
@@ -10558,7 +10279,7 @@
       </p:sp>
       <p:sp>
         <p:nvSpPr>
-          <p:cNvPr id="110" name="Google Shape;110;p5"/>
+          <p:cNvPr id="109" name="Google Shape;109;p5"/>
           <p:cNvSpPr txBox="1"/>
           <p:nvPr>
             <p:ph idx="4294967295" type="sldNum"/>
@@ -10566,7 +10287,7 @@
         </p:nvSpPr>
         <p:spPr>
           <a:xfrm>
-            <a:off x="8784125" y="4804737"/>
+            <a:off x="8872050" y="4797412"/>
             <a:ext cx="203100" cy="184800"/>
           </a:xfrm>
           <a:prstGeom prst="rect">
@@ -10606,7 +10327,7 @@
       </p:sp>
       <p:pic>
         <p:nvPicPr>
-          <p:cNvPr descr="Picture 4" id="111" name="Google Shape;111;p5"/>
+          <p:cNvPr descr="Picture 4" id="110" name="Google Shape;110;p5"/>
           <p:cNvPicPr preferRelativeResize="0"/>
           <p:nvPr/>
         </p:nvPicPr>
@@ -10633,7 +10354,7 @@
       </p:pic>
       <p:sp>
         <p:nvSpPr>
-          <p:cNvPr id="112" name="Google Shape;112;p5"/>
+          <p:cNvPr id="111" name="Google Shape;111;p5"/>
           <p:cNvSpPr/>
           <p:nvPr/>
         </p:nvSpPr>
@@ -10696,7 +10417,7 @@
       </p:sp>
       <p:sp>
         <p:nvSpPr>
-          <p:cNvPr id="113" name="Google Shape;113;p5"/>
+          <p:cNvPr id="112" name="Google Shape;112;p5"/>
           <p:cNvSpPr/>
           <p:nvPr/>
         </p:nvSpPr>
@@ -10759,7 +10480,7 @@
       </p:sp>
       <p:sp>
         <p:nvSpPr>
-          <p:cNvPr id="114" name="Google Shape;114;p5"/>
+          <p:cNvPr id="113" name="Google Shape;113;p5"/>
           <p:cNvSpPr/>
           <p:nvPr/>
         </p:nvSpPr>
@@ -10822,7 +10543,7 @@
       </p:sp>
       <p:grpSp>
         <p:nvGrpSpPr>
-          <p:cNvPr id="115" name="Google Shape;115;p5"/>
+          <p:cNvPr id="114" name="Google Shape;114;p5"/>
           <p:cNvGrpSpPr/>
           <p:nvPr/>
         </p:nvGrpSpPr>
@@ -10836,7 +10557,7 @@
         </p:grpSpPr>
         <p:sp>
           <p:nvSpPr>
-            <p:cNvPr id="116" name="Google Shape;116;p5"/>
+            <p:cNvPr id="115" name="Google Shape;115;p5"/>
             <p:cNvSpPr/>
             <p:nvPr/>
           </p:nvSpPr>
@@ -10850,7 +10571,7 @@
             </a:prstGeom>
             <a:solidFill>
               <a:srgbClr val="13002C">
-                <a:alpha val="73333"/>
+                <a:alpha val="72941"/>
               </a:srgbClr>
             </a:solidFill>
             <a:ln>
@@ -10897,7 +10618,7 @@
         </p:sp>
         <p:sp>
           <p:nvSpPr>
-            <p:cNvPr id="117" name="Google Shape;117;p5"/>
+            <p:cNvPr id="116" name="Google Shape;116;p5"/>
             <p:cNvSpPr/>
             <p:nvPr/>
           </p:nvSpPr>
@@ -10911,7 +10632,7 @@
             </a:prstGeom>
             <a:solidFill>
               <a:srgbClr val="13002C">
-                <a:alpha val="73333"/>
+                <a:alpha val="72941"/>
               </a:srgbClr>
             </a:solidFill>
             <a:ln>
@@ -10958,7 +10679,7 @@
         </p:sp>
         <p:sp>
           <p:nvSpPr>
-            <p:cNvPr id="118" name="Google Shape;118;p5"/>
+            <p:cNvPr id="117" name="Google Shape;117;p5"/>
             <p:cNvSpPr/>
             <p:nvPr/>
           </p:nvSpPr>
@@ -10972,7 +10693,7 @@
             </a:prstGeom>
             <a:solidFill>
               <a:srgbClr val="13002C">
-                <a:alpha val="73333"/>
+                <a:alpha val="72941"/>
               </a:srgbClr>
             </a:solidFill>
             <a:ln>
@@ -11043,7 +10764,7 @@
   <p:cSld>
     <p:spTree>
       <p:nvGrpSpPr>
-        <p:cNvPr id="122" name="Shape 122"/>
+        <p:cNvPr id="121" name="Shape 121"/>
         <p:cNvGrpSpPr/>
         <p:nvPr/>
       </p:nvGrpSpPr>
@@ -11057,7 +10778,7 @@
       </p:grpSpPr>
       <p:sp>
         <p:nvSpPr>
-          <p:cNvPr id="123" name="Google Shape;123;p6"/>
+          <p:cNvPr id="122" name="Google Shape;122;p6"/>
           <p:cNvSpPr txBox="1"/>
           <p:nvPr>
             <p:ph idx="4294967295" type="title"/>
@@ -11117,7 +10838,7 @@
       </p:sp>
       <p:sp>
         <p:nvSpPr>
-          <p:cNvPr id="124" name="Google Shape;124;p6"/>
+          <p:cNvPr id="123" name="Google Shape;123;p6"/>
           <p:cNvSpPr txBox="1"/>
           <p:nvPr>
             <p:ph idx="4294967295" type="sldNum"/>
@@ -11125,7 +10846,7 @@
         </p:nvSpPr>
         <p:spPr>
           <a:xfrm>
-            <a:off x="8838575" y="4773912"/>
+            <a:off x="8801925" y="4773912"/>
             <a:ext cx="203100" cy="184800"/>
           </a:xfrm>
           <a:prstGeom prst="rect">
@@ -11165,7 +10886,7 @@
       </p:sp>
       <p:sp>
         <p:nvSpPr>
-          <p:cNvPr id="125" name="Google Shape;125;p6"/>
+          <p:cNvPr id="124" name="Google Shape;124;p6"/>
           <p:cNvSpPr txBox="1"/>
           <p:nvPr/>
         </p:nvSpPr>
@@ -11231,7 +10952,7 @@
       </p:sp>
       <p:sp>
         <p:nvSpPr>
-          <p:cNvPr id="126" name="Google Shape;126;p6"/>
+          <p:cNvPr id="125" name="Google Shape;125;p6"/>
           <p:cNvSpPr txBox="1"/>
           <p:nvPr/>
         </p:nvSpPr>
@@ -11297,7 +11018,7 @@
       </p:sp>
       <p:sp>
         <p:nvSpPr>
-          <p:cNvPr id="127" name="Google Shape;127;p6"/>
+          <p:cNvPr id="126" name="Google Shape;126;p6"/>
           <p:cNvSpPr/>
           <p:nvPr/>
         </p:nvSpPr>
@@ -11387,7 +11108,7 @@
       </p:sp>
       <p:sp>
         <p:nvSpPr>
-          <p:cNvPr id="128" name="Google Shape;128;p6"/>
+          <p:cNvPr id="127" name="Google Shape;127;p6"/>
           <p:cNvSpPr/>
           <p:nvPr/>
         </p:nvSpPr>
@@ -11477,7 +11198,7 @@
       </p:sp>
       <p:pic>
         <p:nvPicPr>
-          <p:cNvPr descr="Picture 6" id="129" name="Google Shape;129;p6"/>
+          <p:cNvPr descr="Picture 6" id="128" name="Google Shape;128;p6"/>
           <p:cNvPicPr preferRelativeResize="0"/>
           <p:nvPr/>
         </p:nvPicPr>
@@ -11504,7 +11225,7 @@
       </p:pic>
       <p:pic>
         <p:nvPicPr>
-          <p:cNvPr id="130" name="Google Shape;130;p6"/>
+          <p:cNvPr id="129" name="Google Shape;129;p6"/>
           <p:cNvPicPr preferRelativeResize="0"/>
           <p:nvPr/>
         </p:nvPicPr>
@@ -11554,7 +11275,7 @@
   <p:cSld>
     <p:spTree>
       <p:nvGrpSpPr>
-        <p:cNvPr id="134" name="Shape 134"/>
+        <p:cNvPr id="133" name="Shape 133"/>
         <p:cNvGrpSpPr/>
         <p:nvPr/>
       </p:nvGrpSpPr>
@@ -11568,7 +11289,7 @@
       </p:grpSpPr>
       <p:sp>
         <p:nvSpPr>
-          <p:cNvPr id="135" name="Google Shape;135;p7"/>
+          <p:cNvPr id="134" name="Google Shape;134;p7"/>
           <p:cNvSpPr txBox="1"/>
           <p:nvPr>
             <p:ph idx="4294967295" type="title"/>
@@ -11628,14 +11349,14 @@
       </p:sp>
       <p:sp>
         <p:nvSpPr>
-          <p:cNvPr id="136" name="Google Shape;136;p7"/>
+          <p:cNvPr id="135" name="Google Shape;135;p7"/>
           <p:cNvSpPr txBox="1"/>
           <p:nvPr/>
         </p:nvSpPr>
         <p:spPr>
           <a:xfrm>
             <a:off x="711705" y="3507707"/>
-            <a:ext cx="5297138" cy="1328879"/>
+            <a:ext cx="5297100" cy="1400700"/>
           </a:xfrm>
           <a:prstGeom prst="rect">
             <a:avLst/>
@@ -11909,7 +11630,7 @@
               <a:buNone/>
             </a:pPr>
             <a:r>
-              <a:rPr b="0" i="0" lang="en-US" sz="1300" u="none" cap="none" strike="noStrike">
+              <a:rPr lang="en-US" sz="1300">
                 <a:solidFill>
                   <a:srgbClr val="FFFFFF"/>
                 </a:solidFill>
@@ -11918,7 +11639,7 @@
                 <a:cs typeface="Helvetica Neue"/>
                 <a:sym typeface="Helvetica Neue"/>
               </a:rPr>
-              <a:t>Prof. @ University of Tartu</a:t>
+              <a:t>Prof. @ INSA Lyon (France)</a:t>
             </a:r>
             <a:endParaRPr b="0" i="0" sz="1400" u="none" cap="none" strike="noStrike">
               <a:solidFill>
@@ -11934,7 +11655,7 @@
       </p:sp>
       <p:sp>
         <p:nvSpPr>
-          <p:cNvPr id="137" name="Google Shape;137;p7"/>
+          <p:cNvPr id="136" name="Google Shape;136;p7"/>
           <p:cNvSpPr txBox="1"/>
           <p:nvPr>
             <p:ph idx="12" type="sldNum"/>
@@ -11993,6 +11714,285 @@
 </file>
 
 <file path=ppt/theme/theme1.xml><?xml version="1.0" encoding="utf-8"?>
+<a:theme xmlns:a="http://schemas.openxmlformats.org/drawingml/2006/main" xmlns:r="http://schemas.openxmlformats.org/officeDocument/2006/relationships" name="Office Theme">
+  <a:themeElements>
+    <a:clrScheme name="Office Theme">
+      <a:dk1>
+        <a:srgbClr val="000000"/>
+      </a:dk1>
+      <a:lt1>
+        <a:srgbClr val="FFFFFF"/>
+      </a:lt1>
+      <a:dk2>
+        <a:srgbClr val="A7A7A7"/>
+      </a:dk2>
+      <a:lt2>
+        <a:srgbClr val="535353"/>
+      </a:lt2>
+      <a:accent1>
+        <a:srgbClr val="4472C4"/>
+      </a:accent1>
+      <a:accent2>
+        <a:srgbClr val="ED7D31"/>
+      </a:accent2>
+      <a:accent3>
+        <a:srgbClr val="A5A5A5"/>
+      </a:accent3>
+      <a:accent4>
+        <a:srgbClr val="FFC000"/>
+      </a:accent4>
+      <a:accent5>
+        <a:srgbClr val="5B9BD5"/>
+      </a:accent5>
+      <a:accent6>
+        <a:srgbClr val="70AD47"/>
+      </a:accent6>
+      <a:hlink>
+        <a:srgbClr val="0000FF"/>
+      </a:hlink>
+      <a:folHlink>
+        <a:srgbClr val="FF00FF"/>
+      </a:folHlink>
+    </a:clrScheme>
+    <a:fontScheme name="Office">
+      <a:majorFont>
+        <a:latin typeface="Arial"/>
+        <a:ea typeface=""/>
+        <a:cs typeface=""/>
+        <a:font script="Jpan" typeface="ＭＳ Ｐゴシック"/>
+        <a:font script="Hang" typeface="맑은 고딕"/>
+        <a:font script="Hans" typeface="宋体"/>
+        <a:font script="Hant" typeface="新細明體"/>
+        <a:font script="Arab" typeface="Times New Roman"/>
+        <a:font script="Hebr" typeface="Times New Roman"/>
+        <a:font script="Thai" typeface="Angsana New"/>
+        <a:font script="Ethi" typeface="Nyala"/>
+        <a:font script="Beng" typeface="Vrinda"/>
+        <a:font script="Gujr" typeface="Shruti"/>
+        <a:font script="Khmr" typeface="MoolBoran"/>
+        <a:font script="Knda" typeface="Tunga"/>
+        <a:font script="Guru" typeface="Raavi"/>
+        <a:font script="Cans" typeface="Euphemia"/>
+        <a:font script="Cher" typeface="Plantagenet Cherokee"/>
+        <a:font script="Yiii" typeface="Microsoft Yi Baiti"/>
+        <a:font script="Tibt" typeface="Microsoft Himalaya"/>
+        <a:font script="Thaa" typeface="MV Boli"/>
+        <a:font script="Deva" typeface="Mangal"/>
+        <a:font script="Telu" typeface="Gautami"/>
+        <a:font script="Taml" typeface="Latha"/>
+        <a:font script="Syrc" typeface="Estrangelo Edessa"/>
+        <a:font script="Orya" typeface="Kalinga"/>
+        <a:font script="Mlym" typeface="Kartika"/>
+        <a:font script="Laoo" typeface="DokChampa"/>
+        <a:font script="Sinh" typeface="Iskoola Pota"/>
+        <a:font script="Mong" typeface="Mongolian Baiti"/>
+        <a:font script="Viet" typeface="Times New Roman"/>
+        <a:font script="Uigh" typeface="Microsoft Uighur"/>
+        <a:font script="Geor" typeface="Sylfaen"/>
+      </a:majorFont>
+      <a:minorFont>
+        <a:latin typeface="Arial"/>
+        <a:ea typeface=""/>
+        <a:cs typeface=""/>
+        <a:font script="Jpan" typeface="ＭＳ Ｐゴシック"/>
+        <a:font script="Hang" typeface="맑은 고딕"/>
+        <a:font script="Hans" typeface="宋体"/>
+        <a:font script="Hant" typeface="新細明體"/>
+        <a:font script="Arab" typeface="Arial"/>
+        <a:font script="Hebr" typeface="Arial"/>
+        <a:font script="Thai" typeface="Cordia New"/>
+        <a:font script="Ethi" typeface="Nyala"/>
+        <a:font script="Beng" typeface="Vrinda"/>
+        <a:font script="Gujr" typeface="Shruti"/>
+        <a:font script="Khmr" typeface="DaunPenh"/>
+        <a:font script="Knda" typeface="Tunga"/>
+        <a:font script="Guru" typeface="Raavi"/>
+        <a:font script="Cans" typeface="Euphemia"/>
+        <a:font script="Cher" typeface="Plantagenet Cherokee"/>
+        <a:font script="Yiii" typeface="Microsoft Yi Baiti"/>
+        <a:font script="Tibt" typeface="Microsoft Himalaya"/>
+        <a:font script="Thaa" typeface="MV Boli"/>
+        <a:font script="Deva" typeface="Mangal"/>
+        <a:font script="Telu" typeface="Gautami"/>
+        <a:font script="Taml" typeface="Latha"/>
+        <a:font script="Syrc" typeface="Estrangelo Edessa"/>
+        <a:font script="Orya" typeface="Kalinga"/>
+        <a:font script="Mlym" typeface="Kartika"/>
+        <a:font script="Laoo" typeface="DokChampa"/>
+        <a:font script="Sinh" typeface="Iskoola Pota"/>
+        <a:font script="Mong" typeface="Mongolian Baiti"/>
+        <a:font script="Viet" typeface="Arial"/>
+        <a:font script="Uigh" typeface="Microsoft Uighur"/>
+        <a:font script="Geor" typeface="Sylfaen"/>
+      </a:minorFont>
+    </a:fontScheme>
+    <a:fmtScheme name="Office">
+      <a:fillStyleLst>
+        <a:solidFill>
+          <a:schemeClr val="phClr"/>
+        </a:solidFill>
+        <a:gradFill rotWithShape="1">
+          <a:gsLst>
+            <a:gs pos="0">
+              <a:schemeClr val="phClr">
+                <a:tint val="50000"/>
+                <a:satMod val="300000"/>
+              </a:schemeClr>
+            </a:gs>
+            <a:gs pos="35000">
+              <a:schemeClr val="phClr">
+                <a:tint val="37000"/>
+                <a:satMod val="300000"/>
+              </a:schemeClr>
+            </a:gs>
+            <a:gs pos="100000">
+              <a:schemeClr val="phClr">
+                <a:tint val="15000"/>
+                <a:satMod val="350000"/>
+              </a:schemeClr>
+            </a:gs>
+          </a:gsLst>
+          <a:lin ang="16200000" scaled="1"/>
+        </a:gradFill>
+        <a:gradFill rotWithShape="1">
+          <a:gsLst>
+            <a:gs pos="0">
+              <a:schemeClr val="phClr">
+                <a:tint val="100000"/>
+                <a:shade val="100000"/>
+                <a:satMod val="130000"/>
+              </a:schemeClr>
+            </a:gs>
+            <a:gs pos="100000">
+              <a:schemeClr val="phClr">
+                <a:tint val="50000"/>
+                <a:shade val="100000"/>
+                <a:satMod val="350000"/>
+              </a:schemeClr>
+            </a:gs>
+          </a:gsLst>
+          <a:lin ang="16200000" scaled="0"/>
+        </a:gradFill>
+      </a:fillStyleLst>
+      <a:lnStyleLst>
+        <a:ln w="9525" cap="flat" cmpd="sng" algn="ctr">
+          <a:solidFill>
+            <a:schemeClr val="phClr">
+              <a:shade val="95000"/>
+              <a:satMod val="105000"/>
+            </a:schemeClr>
+          </a:solidFill>
+          <a:prstDash val="solid"/>
+        </a:ln>
+        <a:ln w="25400" cap="flat" cmpd="sng" algn="ctr">
+          <a:solidFill>
+            <a:schemeClr val="phClr"/>
+          </a:solidFill>
+          <a:prstDash val="solid"/>
+        </a:ln>
+        <a:ln w="38100" cap="flat" cmpd="sng" algn="ctr">
+          <a:solidFill>
+            <a:schemeClr val="phClr"/>
+          </a:solidFill>
+          <a:prstDash val="solid"/>
+        </a:ln>
+      </a:lnStyleLst>
+      <a:effectStyleLst>
+        <a:effectStyle>
+          <a:effectLst>
+            <a:outerShdw blurRad="40000" dist="20000" dir="5400000" rotWithShape="0">
+              <a:srgbClr val="000000">
+                <a:alpha val="38000"/>
+              </a:srgbClr>
+            </a:outerShdw>
+          </a:effectLst>
+        </a:effectStyle>
+        <a:effectStyle>
+          <a:effectLst>
+            <a:outerShdw blurRad="40000" dist="23000" dir="5400000" rotWithShape="0">
+              <a:srgbClr val="000000">
+                <a:alpha val="35000"/>
+              </a:srgbClr>
+            </a:outerShdw>
+          </a:effectLst>
+        </a:effectStyle>
+        <a:effectStyle>
+          <a:effectLst>
+            <a:outerShdw blurRad="40000" dist="23000" dir="5400000" rotWithShape="0">
+              <a:srgbClr val="000000">
+                <a:alpha val="35000"/>
+              </a:srgbClr>
+            </a:outerShdw>
+          </a:effectLst>
+          <a:scene3d>
+            <a:camera prst="orthographicFront">
+              <a:rot lat="0" lon="0" rev="0"/>
+            </a:camera>
+            <a:lightRig rig="threePt" dir="t">
+              <a:rot lat="0" lon="0" rev="1200000"/>
+            </a:lightRig>
+          </a:scene3d>
+          <a:sp3d>
+            <a:bevelT w="63500" h="25400"/>
+          </a:sp3d>
+        </a:effectStyle>
+      </a:effectStyleLst>
+      <a:bgFillStyleLst>
+        <a:solidFill>
+          <a:schemeClr val="phClr"/>
+        </a:solidFill>
+        <a:gradFill rotWithShape="1">
+          <a:gsLst>
+            <a:gs pos="0">
+              <a:schemeClr val="phClr">
+                <a:tint val="40000"/>
+                <a:satMod val="350000"/>
+              </a:schemeClr>
+            </a:gs>
+            <a:gs pos="40000">
+              <a:schemeClr val="phClr">
+                <a:tint val="45000"/>
+                <a:shade val="99000"/>
+                <a:satMod val="350000"/>
+              </a:schemeClr>
+            </a:gs>
+            <a:gs pos="100000">
+              <a:schemeClr val="phClr">
+                <a:shade val="20000"/>
+                <a:satMod val="255000"/>
+              </a:schemeClr>
+            </a:gs>
+          </a:gsLst>
+          <a:path path="circle">
+            <a:fillToRect l="50000" t="-80000" r="50000" b="180000"/>
+          </a:path>
+        </a:gradFill>
+        <a:gradFill rotWithShape="1">
+          <a:gsLst>
+            <a:gs pos="0">
+              <a:schemeClr val="phClr">
+                <a:tint val="80000"/>
+                <a:satMod val="300000"/>
+              </a:schemeClr>
+            </a:gs>
+            <a:gs pos="100000">
+              <a:schemeClr val="phClr">
+                <a:shade val="30000"/>
+                <a:satMod val="200000"/>
+              </a:schemeClr>
+            </a:gs>
+          </a:gsLst>
+          <a:path path="circle">
+            <a:fillToRect l="50000" t="50000" r="50000" b="50000"/>
+          </a:path>
+        </a:gradFill>
+      </a:bgFillStyleLst>
+    </a:fmtScheme>
+  </a:themeElements>
+</a:theme>
+</file>
+
+<file path=ppt/theme/theme2.xml><?xml version="1.0" encoding="utf-8"?>
 <a:theme xmlns:a="http://schemas.openxmlformats.org/drawingml/2006/main" xmlns:r="http://schemas.openxmlformats.org/officeDocument/2006/relationships" name="1_Office Theme">
   <a:themeElements>
     <a:clrScheme name="1_Office Theme">
@@ -12269,283 +12269,4 @@
     </a:fmtScheme>
   </a:themeElements>
 </a:theme>
-</file>
-
-<file path=ppt/theme/theme2.xml><?xml version="1.0" encoding="utf-8"?>
-<a:theme xmlns:a="http://schemas.openxmlformats.org/drawingml/2006/main" xmlns:r="http://schemas.openxmlformats.org/officeDocument/2006/relationships" name="Office Theme">
-  <a:themeElements>
-    <a:clrScheme name="Office Theme">
-      <a:dk1>
-        <a:srgbClr val="000000"/>
-      </a:dk1>
-      <a:lt1>
-        <a:srgbClr val="FFFFFF"/>
-      </a:lt1>
-      <a:dk2>
-        <a:srgbClr val="A7A7A7"/>
-      </a:dk2>
-      <a:lt2>
-        <a:srgbClr val="535353"/>
-      </a:lt2>
-      <a:accent1>
-        <a:srgbClr val="4472C4"/>
-      </a:accent1>
-      <a:accent2>
-        <a:srgbClr val="ED7D31"/>
-      </a:accent2>
-      <a:accent3>
-        <a:srgbClr val="A5A5A5"/>
-      </a:accent3>
-      <a:accent4>
-        <a:srgbClr val="FFC000"/>
-      </a:accent4>
-      <a:accent5>
-        <a:srgbClr val="5B9BD5"/>
-      </a:accent5>
-      <a:accent6>
-        <a:srgbClr val="70AD47"/>
-      </a:accent6>
-      <a:hlink>
-        <a:srgbClr val="0000FF"/>
-      </a:hlink>
-      <a:folHlink>
-        <a:srgbClr val="FF00FF"/>
-      </a:folHlink>
-    </a:clrScheme>
-    <a:fontScheme name="Office">
-      <a:majorFont>
-        <a:latin typeface="Arial"/>
-        <a:ea typeface=""/>
-        <a:cs typeface=""/>
-        <a:font script="Jpan" typeface="ＭＳ Ｐゴシック"/>
-        <a:font script="Hang" typeface="맑은 고딕"/>
-        <a:font script="Hans" typeface="宋体"/>
-        <a:font script="Hant" typeface="新細明體"/>
-        <a:font script="Arab" typeface="Times New Roman"/>
-        <a:font script="Hebr" typeface="Times New Roman"/>
-        <a:font script="Thai" typeface="Angsana New"/>
-        <a:font script="Ethi" typeface="Nyala"/>
-        <a:font script="Beng" typeface="Vrinda"/>
-        <a:font script="Gujr" typeface="Shruti"/>
-        <a:font script="Khmr" typeface="MoolBoran"/>
-        <a:font script="Knda" typeface="Tunga"/>
-        <a:font script="Guru" typeface="Raavi"/>
-        <a:font script="Cans" typeface="Euphemia"/>
-        <a:font script="Cher" typeface="Plantagenet Cherokee"/>
-        <a:font script="Yiii" typeface="Microsoft Yi Baiti"/>
-        <a:font script="Tibt" typeface="Microsoft Himalaya"/>
-        <a:font script="Thaa" typeface="MV Boli"/>
-        <a:font script="Deva" typeface="Mangal"/>
-        <a:font script="Telu" typeface="Gautami"/>
-        <a:font script="Taml" typeface="Latha"/>
-        <a:font script="Syrc" typeface="Estrangelo Edessa"/>
-        <a:font script="Orya" typeface="Kalinga"/>
-        <a:font script="Mlym" typeface="Kartika"/>
-        <a:font script="Laoo" typeface="DokChampa"/>
-        <a:font script="Sinh" typeface="Iskoola Pota"/>
-        <a:font script="Mong" typeface="Mongolian Baiti"/>
-        <a:font script="Viet" typeface="Times New Roman"/>
-        <a:font script="Uigh" typeface="Microsoft Uighur"/>
-        <a:font script="Geor" typeface="Sylfaen"/>
-      </a:majorFont>
-      <a:minorFont>
-        <a:latin typeface="Arial"/>
-        <a:ea typeface=""/>
-        <a:cs typeface=""/>
-        <a:font script="Jpan" typeface="ＭＳ Ｐゴシック"/>
-        <a:font script="Hang" typeface="맑은 고딕"/>
-        <a:font script="Hans" typeface="宋体"/>
-        <a:font script="Hant" typeface="新細明體"/>
-        <a:font script="Arab" typeface="Arial"/>
-        <a:font script="Hebr" typeface="Arial"/>
-        <a:font script="Thai" typeface="Cordia New"/>
-        <a:font script="Ethi" typeface="Nyala"/>
-        <a:font script="Beng" typeface="Vrinda"/>
-        <a:font script="Gujr" typeface="Shruti"/>
-        <a:font script="Khmr" typeface="DaunPenh"/>
-        <a:font script="Knda" typeface="Tunga"/>
-        <a:font script="Guru" typeface="Raavi"/>
-        <a:font script="Cans" typeface="Euphemia"/>
-        <a:font script="Cher" typeface="Plantagenet Cherokee"/>
-        <a:font script="Yiii" typeface="Microsoft Yi Baiti"/>
-        <a:font script="Tibt" typeface="Microsoft Himalaya"/>
-        <a:font script="Thaa" typeface="MV Boli"/>
-        <a:font script="Deva" typeface="Mangal"/>
-        <a:font script="Telu" typeface="Gautami"/>
-        <a:font script="Taml" typeface="Latha"/>
-        <a:font script="Syrc" typeface="Estrangelo Edessa"/>
-        <a:font script="Orya" typeface="Kalinga"/>
-        <a:font script="Mlym" typeface="Kartika"/>
-        <a:font script="Laoo" typeface="DokChampa"/>
-        <a:font script="Sinh" typeface="Iskoola Pota"/>
-        <a:font script="Mong" typeface="Mongolian Baiti"/>
-        <a:font script="Viet" typeface="Arial"/>
-        <a:font script="Uigh" typeface="Microsoft Uighur"/>
-        <a:font script="Geor" typeface="Sylfaen"/>
-      </a:minorFont>
-    </a:fontScheme>
-    <a:fmtScheme name="Office">
-      <a:fillStyleLst>
-        <a:solidFill>
-          <a:schemeClr val="phClr"/>
-        </a:solidFill>
-        <a:gradFill rotWithShape="1">
-          <a:gsLst>
-            <a:gs pos="0">
-              <a:schemeClr val="phClr">
-                <a:tint val="50000"/>
-                <a:satMod val="300000"/>
-              </a:schemeClr>
-            </a:gs>
-            <a:gs pos="35000">
-              <a:schemeClr val="phClr">
-                <a:tint val="37000"/>
-                <a:satMod val="300000"/>
-              </a:schemeClr>
-            </a:gs>
-            <a:gs pos="100000">
-              <a:schemeClr val="phClr">
-                <a:tint val="15000"/>
-                <a:satMod val="350000"/>
-              </a:schemeClr>
-            </a:gs>
-          </a:gsLst>
-          <a:lin ang="16200000" scaled="1"/>
-        </a:gradFill>
-        <a:gradFill rotWithShape="1">
-          <a:gsLst>
-            <a:gs pos="0">
-              <a:schemeClr val="phClr">
-                <a:tint val="100000"/>
-                <a:shade val="100000"/>
-                <a:satMod val="130000"/>
-              </a:schemeClr>
-            </a:gs>
-            <a:gs pos="100000">
-              <a:schemeClr val="phClr">
-                <a:tint val="50000"/>
-                <a:shade val="100000"/>
-                <a:satMod val="350000"/>
-              </a:schemeClr>
-            </a:gs>
-          </a:gsLst>
-          <a:lin ang="16200000" scaled="0"/>
-        </a:gradFill>
-      </a:fillStyleLst>
-      <a:lnStyleLst>
-        <a:ln w="9525" cap="flat" cmpd="sng" algn="ctr">
-          <a:solidFill>
-            <a:schemeClr val="phClr">
-              <a:shade val="95000"/>
-              <a:satMod val="105000"/>
-            </a:schemeClr>
-          </a:solidFill>
-          <a:prstDash val="solid"/>
-        </a:ln>
-        <a:ln w="25400" cap="flat" cmpd="sng" algn="ctr">
-          <a:solidFill>
-            <a:schemeClr val="phClr"/>
-          </a:solidFill>
-          <a:prstDash val="solid"/>
-        </a:ln>
-        <a:ln w="38100" cap="flat" cmpd="sng" algn="ctr">
-          <a:solidFill>
-            <a:schemeClr val="phClr"/>
-          </a:solidFill>
-          <a:prstDash val="solid"/>
-        </a:ln>
-      </a:lnStyleLst>
-      <a:effectStyleLst>
-        <a:effectStyle>
-          <a:effectLst>
-            <a:outerShdw blurRad="40000" dist="20000" dir="5400000" rotWithShape="0">
-              <a:srgbClr val="000000">
-                <a:alpha val="38000"/>
-              </a:srgbClr>
-            </a:outerShdw>
-          </a:effectLst>
-        </a:effectStyle>
-        <a:effectStyle>
-          <a:effectLst>
-            <a:outerShdw blurRad="40000" dist="23000" dir="5400000" rotWithShape="0">
-              <a:srgbClr val="000000">
-                <a:alpha val="35000"/>
-              </a:srgbClr>
-            </a:outerShdw>
-          </a:effectLst>
-        </a:effectStyle>
-        <a:effectStyle>
-          <a:effectLst>
-            <a:outerShdw blurRad="40000" dist="23000" dir="5400000" rotWithShape="0">
-              <a:srgbClr val="000000">
-                <a:alpha val="35000"/>
-              </a:srgbClr>
-            </a:outerShdw>
-          </a:effectLst>
-          <a:scene3d>
-            <a:camera prst="orthographicFront">
-              <a:rot lat="0" lon="0" rev="0"/>
-            </a:camera>
-            <a:lightRig rig="threePt" dir="t">
-              <a:rot lat="0" lon="0" rev="1200000"/>
-            </a:lightRig>
-          </a:scene3d>
-          <a:sp3d>
-            <a:bevelT w="63500" h="25400"/>
-          </a:sp3d>
-        </a:effectStyle>
-      </a:effectStyleLst>
-      <a:bgFillStyleLst>
-        <a:solidFill>
-          <a:schemeClr val="phClr"/>
-        </a:solidFill>
-        <a:gradFill rotWithShape="1">
-          <a:gsLst>
-            <a:gs pos="0">
-              <a:schemeClr val="phClr">
-                <a:tint val="40000"/>
-                <a:satMod val="350000"/>
-              </a:schemeClr>
-            </a:gs>
-            <a:gs pos="40000">
-              <a:schemeClr val="phClr">
-                <a:tint val="45000"/>
-                <a:shade val="99000"/>
-                <a:satMod val="350000"/>
-              </a:schemeClr>
-            </a:gs>
-            <a:gs pos="100000">
-              <a:schemeClr val="phClr">
-                <a:shade val="20000"/>
-                <a:satMod val="255000"/>
-              </a:schemeClr>
-            </a:gs>
-          </a:gsLst>
-          <a:path path="circle">
-            <a:fillToRect l="50000" t="-80000" r="50000" b="180000"/>
-          </a:path>
-        </a:gradFill>
-        <a:gradFill rotWithShape="1">
-          <a:gsLst>
-            <a:gs pos="0">
-              <a:schemeClr val="phClr">
-                <a:tint val="80000"/>
-                <a:satMod val="300000"/>
-              </a:schemeClr>
-            </a:gs>
-            <a:gs pos="100000">
-              <a:schemeClr val="phClr">
-                <a:shade val="30000"/>
-                <a:satMod val="200000"/>
-              </a:schemeClr>
-            </a:gs>
-          </a:gsLst>
-          <a:path path="circle">
-            <a:fillToRect l="50000" t="50000" r="50000" b="50000"/>
-          </a:path>
-        </a:gradFill>
-      </a:bgFillStyleLst>
-    </a:fmtScheme>
-  </a:themeElements>
-</a:theme>
 </file>
</xml_diff>